<commit_message>
UI Design Template.pptx 수정 1. 팀 명, System Process 변경
</commit_message>
<xml_diff>
--- a/doc/3_ 설계서/UI Design Template.pptx
+++ b/doc/3_ 설계서/UI Design Template.pptx
@@ -145,6 +145,41 @@
       </a:defRPr>
     </a:lvl9pPr>
   </p:defaultTextStyle>
+  <p:extLst>
+    <p:ext uri="{EFAFB233-063F-42B5-8137-9DF3F51BA10A}">
+      <p15:sldGuideLst xmlns:p15="http://schemas.microsoft.com/office/powerpoint/2012/main">
+        <p15:guide id="1" orient="horz">
+          <p15:clr>
+            <a:srgbClr val="A4A3A4"/>
+          </p15:clr>
+        </p15:guide>
+        <p15:guide id="2" pos="2880">
+          <p15:clr>
+            <a:srgbClr val="A4A3A4"/>
+          </p15:clr>
+        </p15:guide>
+        <p15:guide id="3" pos="6">
+          <p15:clr>
+            <a:srgbClr val="A4A3A4"/>
+          </p15:clr>
+        </p15:guide>
+      </p15:sldGuideLst>
+    </p:ext>
+    <p:ext uri="{2D200454-40CA-4A62-9FC3-DE9A4176ACB9}">
+      <p15:notesGuideLst xmlns:p15="http://schemas.microsoft.com/office/powerpoint/2012/main">
+        <p15:guide id="1" orient="horz" pos="3126">
+          <p15:clr>
+            <a:srgbClr val="A4A3A4"/>
+          </p15:clr>
+        </p15:guide>
+        <p15:guide id="2" pos="2140">
+          <p15:clr>
+            <a:srgbClr val="A4A3A4"/>
+          </p15:clr>
+        </p15:guide>
+      </p15:notesGuideLst>
+    </p:ext>
+  </p:extLst>
 </p:presentation>
 </file>
 
@@ -2231,8 +2266,8 @@
         </p:nvSpPr>
         <p:spPr>
           <a:xfrm>
-            <a:off x="7751445" y="4372844"/>
-            <a:ext cx="768159" cy="400110"/>
+            <a:off x="7404936" y="4372844"/>
+            <a:ext cx="1311578" cy="400110"/>
           </a:xfrm>
           <a:prstGeom prst="rect">
             <a:avLst/>
@@ -2246,10 +2281,10 @@
           <a:lstStyle/>
           <a:p>
             <a:r>
-              <a:rPr lang="ko-KR" altLang="en-US" sz="2000" dirty="0" smtClean="0"/>
-              <a:t>팀 명</a:t>
+              <a:rPr lang="en-US" altLang="ko-KR" sz="2000" b="1" dirty="0" smtClean="0"/>
+              <a:t>Big Bang</a:t>
             </a:r>
-            <a:endParaRPr lang="ko-KR" altLang="en-US" sz="2000" dirty="0"/>
+            <a:endParaRPr lang="ko-KR" altLang="en-US" sz="2000" b="1" dirty="0"/>
           </a:p>
         </p:txBody>
       </p:sp>
@@ -2311,7 +2346,7 @@
             <p:ph idx="1"/>
             <p:extLst>
               <p:ext uri="{D42A27DB-BD31-4B8C-83A1-F6EECF244321}">
-                <p14:modId xmlns:p14="http://schemas.microsoft.com/office/powerpoint/2010/main" val="3459876744"/>
+                <p14:modId xmlns:p14="http://schemas.microsoft.com/office/powerpoint/2010/main" val="2799890574"/>
               </p:ext>
             </p:extLst>
           </p:nvPr>
@@ -2461,6 +2496,16 @@
                     <a:lstStyle/>
                     <a:p>
                       <a:pPr algn="ctr" latinLnBrk="1"/>
+                      <a:r>
+                        <a:rPr lang="en-US" altLang="ko-KR" sz="1200" b="0" dirty="0" smtClean="0">
+                          <a:solidFill>
+                            <a:schemeClr val="tx1"/>
+                          </a:solidFill>
+                          <a:latin typeface="맑은 고딕" pitchFamily="50" charset="-127"/>
+                          <a:ea typeface="맑은 고딕" pitchFamily="50" charset="-127"/>
+                        </a:rPr>
+                        <a:t>2017-05-26</a:t>
+                      </a:r>
                       <a:endParaRPr lang="ko-KR" altLang="en-US" sz="1200" b="0" dirty="0">
                         <a:solidFill>
                           <a:schemeClr val="tx1"/>
@@ -2482,6 +2527,16 @@
                     <a:lstStyle/>
                     <a:p>
                       <a:pPr algn="ctr" latinLnBrk="1"/>
+                      <a:r>
+                        <a:rPr lang="en-US" altLang="ko-KR" sz="1200" b="0" dirty="0" smtClean="0">
+                          <a:solidFill>
+                            <a:schemeClr val="tx1"/>
+                          </a:solidFill>
+                          <a:latin typeface="맑은 고딕" pitchFamily="50" charset="-127"/>
+                          <a:ea typeface="맑은 고딕" pitchFamily="50" charset="-127"/>
+                        </a:rPr>
+                        <a:t>V1.0</a:t>
+                      </a:r>
                       <a:endParaRPr lang="ko-KR" altLang="en-US" sz="1200" b="0" dirty="0">
                         <a:solidFill>
                           <a:schemeClr val="tx1"/>
@@ -2503,6 +2558,36 @@
                     <a:lstStyle/>
                     <a:p>
                       <a:pPr latinLnBrk="1"/>
+                      <a:r>
+                        <a:rPr lang="en-US" altLang="ko-KR" sz="1200" b="0" baseline="0" dirty="0" smtClean="0">
+                          <a:solidFill>
+                            <a:schemeClr val="tx1"/>
+                          </a:solidFill>
+                          <a:latin typeface="맑은 고딕" pitchFamily="50" charset="-127"/>
+                          <a:ea typeface="맑은 고딕" pitchFamily="50" charset="-127"/>
+                        </a:rPr>
+                        <a:t> </a:t>
+                      </a:r>
+                      <a:r>
+                        <a:rPr lang="ko-KR" altLang="en-US" sz="1200" b="0" baseline="0" dirty="0" smtClean="0">
+                          <a:solidFill>
+                            <a:schemeClr val="tx1"/>
+                          </a:solidFill>
+                          <a:latin typeface="맑은 고딕" pitchFamily="50" charset="-127"/>
+                          <a:ea typeface="맑은 고딕" pitchFamily="50" charset="-127"/>
+                        </a:rPr>
+                        <a:t>팀 명</a:t>
+                      </a:r>
+                      <a:r>
+                        <a:rPr lang="en-US" altLang="ko-KR" sz="1200" b="0" baseline="0" dirty="0" smtClean="0">
+                          <a:solidFill>
+                            <a:schemeClr val="tx1"/>
+                          </a:solidFill>
+                          <a:latin typeface="맑은 고딕" pitchFamily="50" charset="-127"/>
+                          <a:ea typeface="맑은 고딕" pitchFamily="50" charset="-127"/>
+                        </a:rPr>
+                        <a:t>,  System Process</a:t>
+                      </a:r>
                       <a:endParaRPr lang="ko-KR" altLang="en-US" sz="1200" b="0" dirty="0">
                         <a:solidFill>
                           <a:schemeClr val="tx1"/>
@@ -2524,6 +2609,26 @@
                     <a:lstStyle/>
                     <a:p>
                       <a:pPr algn="ctr" latinLnBrk="1"/>
+                      <a:r>
+                        <a:rPr lang="ko-KR" altLang="en-US" sz="1200" b="0" dirty="0" smtClean="0">
+                          <a:solidFill>
+                            <a:schemeClr val="tx1"/>
+                          </a:solidFill>
+                          <a:latin typeface="맑은 고딕" pitchFamily="50" charset="-127"/>
+                          <a:ea typeface="맑은 고딕" pitchFamily="50" charset="-127"/>
+                        </a:rPr>
+                        <a:t>서현</a:t>
+                      </a:r>
+                      <a:r>
+                        <a:rPr lang="ko-KR" altLang="en-US" sz="1200" b="0" dirty="0" smtClean="0">
+                          <a:solidFill>
+                            <a:schemeClr val="tx1"/>
+                          </a:solidFill>
+                          <a:latin typeface="맑은 고딕" pitchFamily="50" charset="-127"/>
+                          <a:ea typeface="맑은 고딕" pitchFamily="50" charset="-127"/>
+                        </a:rPr>
+                        <a:t>아</a:t>
+                      </a:r>
                       <a:endParaRPr lang="ko-KR" altLang="en-US" sz="1200" b="0" dirty="0">
                         <a:solidFill>
                           <a:schemeClr val="tx1"/>
@@ -3306,45 +3411,6 @@
       </p:sp>
       <p:sp>
         <p:nvSpPr>
-          <p:cNvPr id="3" name="내용 개체 틀 2"/>
-          <p:cNvSpPr>
-            <a:spLocks noGrp="1"/>
-          </p:cNvSpPr>
-          <p:nvPr>
-            <p:ph idx="1"/>
-          </p:nvPr>
-        </p:nvSpPr>
-        <p:spPr/>
-        <p:txBody>
-          <a:bodyPr/>
-          <a:lstStyle/>
-          <a:p>
-            <a:pPr marL="0" indent="0">
-              <a:buNone/>
-            </a:pPr>
-            <a:r>
-              <a:rPr lang="ko-KR" altLang="en-US" dirty="0" smtClean="0">
-                <a:latin typeface="맑은 고딕" pitchFamily="50" charset="-127"/>
-                <a:ea typeface="맑은 고딕" pitchFamily="50" charset="-127"/>
-              </a:rPr>
-              <a:t>예제</a:t>
-            </a:r>
-            <a:r>
-              <a:rPr lang="en-US" altLang="ko-KR" dirty="0" smtClean="0">
-                <a:latin typeface="맑은 고딕" pitchFamily="50" charset="-127"/>
-                <a:ea typeface="맑은 고딕" pitchFamily="50" charset="-127"/>
-              </a:rPr>
-              <a:t>) </a:t>
-            </a:r>
-            <a:endParaRPr lang="ko-KR" altLang="en-US" dirty="0">
-              <a:latin typeface="맑은 고딕" pitchFamily="50" charset="-127"/>
-              <a:ea typeface="맑은 고딕" pitchFamily="50" charset="-127"/>
-            </a:endParaRPr>
-          </a:p>
-        </p:txBody>
-      </p:sp>
-      <p:sp>
-        <p:nvSpPr>
           <p:cNvPr id="4" name="바닥글 개체 틀 3"/>
           <p:cNvSpPr>
             <a:spLocks noGrp="1"/>
@@ -3369,9 +3435,9 @@
       </p:sp>
       <p:pic>
         <p:nvPicPr>
-          <p:cNvPr id="20" name="Picture 2"/>
+          <p:cNvPr id="6" name="그림 5"/>
           <p:cNvPicPr>
-            <a:picLocks noChangeAspect="1" noChangeArrowheads="1"/>
+            <a:picLocks noChangeAspect="1"/>
           </p:cNvPicPr>
           <p:nvPr/>
         </p:nvPicPr>
@@ -3383,52 +3449,18 @@
               </a:ext>
             </a:extLst>
           </a:blip>
-          <a:srcRect/>
           <a:stretch>
             <a:fillRect/>
           </a:stretch>
         </p:blipFill>
-        <p:spPr bwMode="auto">
+        <p:spPr>
           <a:xfrm>
-            <a:off x="1212850" y="1310215"/>
-            <a:ext cx="6718300" cy="4949825"/>
+            <a:off x="548640" y="1225245"/>
+            <a:ext cx="7740268" cy="5025565"/>
           </a:xfrm>
           <a:prstGeom prst="rect">
             <a:avLst/>
           </a:prstGeom>
-          <a:noFill/>
-          <a:ln>
-            <a:noFill/>
-          </a:ln>
-          <a:effectLst/>
-          <a:extLst>
-            <a:ext uri="{909E8E84-426E-40DD-AFC4-6F175D3DCCD1}">
-              <a14:hiddenFill xmlns:a14="http://schemas.microsoft.com/office/drawing/2010/main">
-                <a:solidFill>
-                  <a:schemeClr val="accent1"/>
-                </a:solidFill>
-              </a14:hiddenFill>
-            </a:ext>
-            <a:ext uri="{91240B29-F687-4F45-9708-019B960494DF}">
-              <a14:hiddenLine xmlns:a14="http://schemas.microsoft.com/office/drawing/2010/main" w="9525">
-                <a:solidFill>
-                  <a:schemeClr val="tx1"/>
-                </a:solidFill>
-                <a:miter lim="800000"/>
-                <a:headEnd/>
-                <a:tailEnd/>
-              </a14:hiddenLine>
-            </a:ext>
-            <a:ext uri="{AF507438-7753-43E0-B8FC-AC1667EBCBE1}">
-              <a14:hiddenEffects xmlns:a14="http://schemas.microsoft.com/office/drawing/2010/main">
-                <a:effectLst>
-                  <a:outerShdw dist="35921" dir="2700000" algn="ctr" rotWithShape="0">
-                    <a:schemeClr val="bg2"/>
-                  </a:outerShdw>
-                </a:effectLst>
-              </a14:hiddenEffects>
-            </a:ext>
-          </a:extLst>
         </p:spPr>
       </p:pic>
     </p:spTree>

</xml_diff>

<commit_message>
UI Design Template.pptx 변경
System Map 변경
</commit_message>
<xml_diff>
--- a/doc/3_ 설계서/UI Design Template.pptx
+++ b/doc/3_ 설계서/UI Design Template.pptx
@@ -2346,7 +2346,7 @@
             <p:ph idx="1"/>
             <p:extLst>
               <p:ext uri="{D42A27DB-BD31-4B8C-83A1-F6EECF244321}">
-                <p14:modId xmlns:p14="http://schemas.microsoft.com/office/powerpoint/2010/main" val="2799890574"/>
+                <p14:modId xmlns:p14="http://schemas.microsoft.com/office/powerpoint/2010/main" val="987332049"/>
               </p:ext>
             </p:extLst>
           </p:nvPr>
@@ -2617,17 +2617,7 @@
                           <a:latin typeface="맑은 고딕" pitchFamily="50" charset="-127"/>
                           <a:ea typeface="맑은 고딕" pitchFamily="50" charset="-127"/>
                         </a:rPr>
-                        <a:t>서현</a:t>
-                      </a:r>
-                      <a:r>
-                        <a:rPr lang="ko-KR" altLang="en-US" sz="1200" b="0" dirty="0" smtClean="0">
-                          <a:solidFill>
-                            <a:schemeClr val="tx1"/>
-                          </a:solidFill>
-                          <a:latin typeface="맑은 고딕" pitchFamily="50" charset="-127"/>
-                          <a:ea typeface="맑은 고딕" pitchFamily="50" charset="-127"/>
-                        </a:rPr>
-                        <a:t>아</a:t>
+                        <a:t>서현아</a:t>
                       </a:r>
                       <a:endParaRPr lang="ko-KR" altLang="en-US" sz="1200" b="0" dirty="0">
                         <a:solidFill>
@@ -2652,6 +2642,16 @@
                     <a:lstStyle/>
                     <a:p>
                       <a:pPr algn="ctr" latinLnBrk="1"/>
+                      <a:r>
+                        <a:rPr lang="en-US" altLang="ko-KR" sz="1200" b="0" dirty="0" smtClean="0">
+                          <a:solidFill>
+                            <a:schemeClr val="tx1"/>
+                          </a:solidFill>
+                          <a:latin typeface="맑은 고딕" pitchFamily="50" charset="-127"/>
+                          <a:ea typeface="맑은 고딕" pitchFamily="50" charset="-127"/>
+                        </a:rPr>
+                        <a:t>2017-05-26</a:t>
+                      </a:r>
                       <a:endParaRPr lang="ko-KR" altLang="en-US" sz="1200" b="0" dirty="0">
                         <a:solidFill>
                           <a:schemeClr val="tx1"/>
@@ -2673,6 +2673,16 @@
                     <a:lstStyle/>
                     <a:p>
                       <a:pPr algn="ctr" latinLnBrk="1"/>
+                      <a:r>
+                        <a:rPr lang="en-US" altLang="ko-KR" sz="1200" b="0" dirty="0" smtClean="0">
+                          <a:solidFill>
+                            <a:schemeClr val="tx1"/>
+                          </a:solidFill>
+                          <a:latin typeface="맑은 고딕" pitchFamily="50" charset="-127"/>
+                          <a:ea typeface="맑은 고딕" pitchFamily="50" charset="-127"/>
+                        </a:rPr>
+                        <a:t>V1.1</a:t>
+                      </a:r>
                       <a:endParaRPr lang="ko-KR" altLang="en-US" sz="1200" b="0" dirty="0">
                         <a:solidFill>
                           <a:schemeClr val="tx1"/>
@@ -2694,7 +2704,27 @@
                     <a:lstStyle/>
                     <a:p>
                       <a:pPr latinLnBrk="1"/>
-                      <a:endParaRPr lang="ko-KR" altLang="en-US" sz="1200" b="0">
+                      <a:r>
+                        <a:rPr lang="en-US" altLang="ko-KR" sz="1200" b="0" dirty="0" smtClean="0">
+                          <a:solidFill>
+                            <a:schemeClr val="tx1"/>
+                          </a:solidFill>
+                          <a:latin typeface="맑은 고딕" pitchFamily="50" charset="-127"/>
+                          <a:ea typeface="맑은 고딕" pitchFamily="50" charset="-127"/>
+                        </a:rPr>
+                        <a:t> System</a:t>
+                      </a:r>
+                      <a:r>
+                        <a:rPr lang="en-US" altLang="ko-KR" sz="1200" b="0" baseline="0" dirty="0" smtClean="0">
+                          <a:solidFill>
+                            <a:schemeClr val="tx1"/>
+                          </a:solidFill>
+                          <a:latin typeface="맑은 고딕" pitchFamily="50" charset="-127"/>
+                          <a:ea typeface="맑은 고딕" pitchFamily="50" charset="-127"/>
+                        </a:rPr>
+                        <a:t> Map </a:t>
+                      </a:r>
+                      <a:endParaRPr lang="ko-KR" altLang="en-US" sz="1200" b="0" dirty="0">
                         <a:solidFill>
                           <a:schemeClr val="tx1"/>
                         </a:solidFill>
@@ -2715,6 +2745,16 @@
                     <a:lstStyle/>
                     <a:p>
                       <a:pPr algn="ctr" latinLnBrk="1"/>
+                      <a:r>
+                        <a:rPr lang="ko-KR" altLang="en-US" sz="1200" b="0" smtClean="0">
+                          <a:solidFill>
+                            <a:schemeClr val="tx1"/>
+                          </a:solidFill>
+                          <a:latin typeface="맑은 고딕" pitchFamily="50" charset="-127"/>
+                          <a:ea typeface="맑은 고딕" pitchFamily="50" charset="-127"/>
+                        </a:rPr>
+                        <a:t>신동규</a:t>
+                      </a:r>
                       <a:endParaRPr lang="ko-KR" altLang="en-US" sz="1200" b="0" dirty="0">
                         <a:solidFill>
                           <a:schemeClr val="tx1"/>
@@ -3306,47 +3346,2134 @@
           </a:p>
         </p:txBody>
       </p:sp>
-      <p:pic>
-        <p:nvPicPr>
-          <p:cNvPr id="1026" name="Picture 2" descr="site map template, site map example"/>
-          <p:cNvPicPr>
-            <a:picLocks noChangeAspect="1" noChangeArrowheads="1"/>
-          </p:cNvPicPr>
+      <p:grpSp>
+        <p:nvGrpSpPr>
+          <p:cNvPr id="45" name="그룹 44"/>
+          <p:cNvGrpSpPr/>
           <p:nvPr/>
-        </p:nvPicPr>
-        <p:blipFill>
-          <a:blip r:embed="rId2">
-            <a:extLst>
-              <a:ext uri="{28A0092B-C50C-407E-A947-70E740481C1C}">
-                <a14:useLocalDpi xmlns:a14="http://schemas.microsoft.com/office/drawing/2010/main" val="0"/>
-              </a:ext>
-            </a:extLst>
-          </a:blip>
-          <a:srcRect/>
-          <a:stretch>
-            <a:fillRect/>
-          </a:stretch>
-        </p:blipFill>
-        <p:spPr bwMode="auto">
+        </p:nvGrpSpPr>
+        <p:grpSpPr>
           <a:xfrm>
-            <a:off x="2267138" y="1284656"/>
-            <a:ext cx="4609724" cy="5047752"/>
+            <a:off x="1173698" y="1260764"/>
+            <a:ext cx="6796604" cy="4657018"/>
+            <a:chOff x="1050832" y="175623"/>
+            <a:chExt cx="6592425" cy="6164318"/>
           </a:xfrm>
-          <a:prstGeom prst="rect">
-            <a:avLst/>
-          </a:prstGeom>
-          <a:noFill/>
-          <a:extLst>
-            <a:ext uri="{909E8E84-426E-40DD-AFC4-6F175D3DCCD1}">
-              <a14:hiddenFill xmlns:a14="http://schemas.microsoft.com/office/drawing/2010/main">
+        </p:grpSpPr>
+        <p:sp>
+          <p:nvSpPr>
+            <p:cNvPr id="46" name="직사각형 45"/>
+            <p:cNvSpPr/>
+            <p:nvPr/>
+          </p:nvSpPr>
+          <p:spPr bwMode="auto">
+            <a:xfrm>
+              <a:off x="5813939" y="2988994"/>
+              <a:ext cx="1829317" cy="589976"/>
+            </a:xfrm>
+            <a:prstGeom prst="rect">
+              <a:avLst/>
+            </a:prstGeom>
+            <a:solidFill>
+              <a:srgbClr val="FFC000">
+                <a:alpha val="55000"/>
+              </a:srgbClr>
+            </a:solidFill>
+            <a:ln w="31750" cap="flat" cmpd="dbl" algn="ctr">
+              <a:solidFill>
+                <a:schemeClr val="tx1"/>
+              </a:solidFill>
+              <a:prstDash val="solid"/>
+              <a:round/>
+              <a:headEnd type="none" w="med" len="med"/>
+              <a:tailEnd type="none" w="med" len="med"/>
+            </a:ln>
+            <a:effectLst/>
+          </p:spPr>
+          <p:txBody>
+            <a:bodyPr vert="horz" wrap="none" lIns="90000" tIns="46800" rIns="90000" bIns="46800" numCol="1" rtlCol="0" anchor="ctr" anchorCtr="0" compatLnSpc="1">
+              <a:prstTxWarp prst="textNoShape">
+                <a:avLst/>
+              </a:prstTxWarp>
+            </a:bodyPr>
+            <a:lstStyle/>
+            <a:p>
+              <a:pPr marL="0" marR="0" indent="0" algn="ctr" defTabSz="914400" rtl="0" eaLnBrk="0" fontAlgn="base" latinLnBrk="0" hangingPunct="0">
+                <a:lnSpc>
+                  <a:spcPct val="100000"/>
+                </a:lnSpc>
+                <a:spcBef>
+                  <a:spcPct val="0"/>
+                </a:spcBef>
+                <a:spcAft>
+                  <a:spcPct val="0"/>
+                </a:spcAft>
+                <a:buClrTx/>
+                <a:buSzTx/>
+                <a:buFontTx/>
+                <a:buNone/>
+                <a:tabLst/>
+              </a:pPr>
+              <a:r>
+                <a:rPr lang="ko-KR" altLang="en-US" sz="1200" dirty="0" smtClean="0">
+                  <a:latin typeface="맑은 고딕" pitchFamily="50" charset="-127"/>
+                  <a:ea typeface="맑은 고딕" pitchFamily="50" charset="-127"/>
+                </a:rPr>
+                <a:t>메모 출력 저장 불러오기</a:t>
+              </a:r>
+              <a:endParaRPr kumimoji="0" lang="en-US" altLang="ko-KR" sz="1200" b="0" i="0" u="none" strike="noStrike" cap="none" normalizeH="0" baseline="0" dirty="0">
+                <a:ln>
+                  <a:noFill/>
+                </a:ln>
                 <a:solidFill>
-                  <a:srgbClr val="FFFFFF"/>
+                  <a:schemeClr val="tx1"/>
                 </a:solidFill>
-              </a14:hiddenFill>
-            </a:ext>
-          </a:extLst>
-        </p:spPr>
-      </p:pic>
+                <a:effectLst/>
+                <a:latin typeface="맑은 고딕" pitchFamily="50" charset="-127"/>
+                <a:ea typeface="맑은 고딕" pitchFamily="50" charset="-127"/>
+              </a:endParaRPr>
+            </a:p>
+          </p:txBody>
+        </p:sp>
+        <p:grpSp>
+          <p:nvGrpSpPr>
+            <p:cNvPr id="47" name="그룹 46"/>
+            <p:cNvGrpSpPr/>
+            <p:nvPr/>
+          </p:nvGrpSpPr>
+          <p:grpSpPr>
+            <a:xfrm>
+              <a:off x="1050832" y="175623"/>
+              <a:ext cx="6592425" cy="6164318"/>
+              <a:chOff x="831376" y="299982"/>
+              <a:chExt cx="6592425" cy="6164318"/>
+            </a:xfrm>
+          </p:grpSpPr>
+          <p:sp>
+            <p:nvSpPr>
+              <p:cNvPr id="49" name="직사각형 48"/>
+              <p:cNvSpPr/>
+              <p:nvPr/>
+            </p:nvSpPr>
+            <p:spPr bwMode="auto">
+              <a:xfrm>
+                <a:off x="1061133" y="299983"/>
+                <a:ext cx="1807622" cy="590475"/>
+              </a:xfrm>
+              <a:prstGeom prst="rect">
+                <a:avLst/>
+              </a:prstGeom>
+              <a:solidFill>
+                <a:srgbClr val="FFC000">
+                  <a:alpha val="55000"/>
+                </a:srgbClr>
+              </a:solidFill>
+              <a:ln w="31750" cap="flat" cmpd="dbl" algn="ctr">
+                <a:solidFill>
+                  <a:schemeClr val="tx1"/>
+                </a:solidFill>
+                <a:prstDash val="solid"/>
+                <a:round/>
+                <a:headEnd type="none" w="med" len="med"/>
+                <a:tailEnd type="none" w="med" len="med"/>
+              </a:ln>
+              <a:effectLst/>
+            </p:spPr>
+            <p:txBody>
+              <a:bodyPr vert="horz" wrap="none" lIns="90000" tIns="46800" rIns="90000" bIns="46800" numCol="1" rtlCol="0" anchor="ctr" anchorCtr="0" compatLnSpc="1">
+                <a:prstTxWarp prst="textNoShape">
+                  <a:avLst/>
+                </a:prstTxWarp>
+              </a:bodyPr>
+              <a:lstStyle/>
+              <a:p>
+                <a:pPr marL="0" marR="0" indent="0" algn="ctr" defTabSz="914400" rtl="0" eaLnBrk="0" fontAlgn="base" latinLnBrk="0" hangingPunct="0">
+                  <a:lnSpc>
+                    <a:spcPct val="100000"/>
+                  </a:lnSpc>
+                  <a:spcBef>
+                    <a:spcPct val="0"/>
+                  </a:spcBef>
+                  <a:spcAft>
+                    <a:spcPct val="0"/>
+                  </a:spcAft>
+                  <a:buClrTx/>
+                  <a:buSzTx/>
+                  <a:buFontTx/>
+                  <a:buNone/>
+                  <a:tabLst/>
+                </a:pPr>
+                <a:r>
+                  <a:rPr lang="en-US" altLang="ko-KR" dirty="0" err="1">
+                    <a:latin typeface="맑은 고딕" pitchFamily="50" charset="-127"/>
+                    <a:ea typeface="맑은 고딕" pitchFamily="50" charset="-127"/>
+                  </a:rPr>
+                  <a:t>ToDoList</a:t>
+                </a:r>
+                <a:r>
+                  <a:rPr lang="en-US" altLang="ko-KR" dirty="0">
+                    <a:latin typeface="맑은 고딕" pitchFamily="50" charset="-127"/>
+                    <a:ea typeface="맑은 고딕" pitchFamily="50" charset="-127"/>
+                  </a:rPr>
+                  <a:t> Program</a:t>
+                </a:r>
+                <a:endParaRPr kumimoji="0" lang="ko-KR" altLang="en-US" sz="1400" b="0" i="0" u="none" strike="noStrike" cap="none" normalizeH="0" baseline="0" dirty="0">
+                  <a:ln>
+                    <a:noFill/>
+                  </a:ln>
+                  <a:solidFill>
+                    <a:schemeClr val="tx1"/>
+                  </a:solidFill>
+                  <a:effectLst/>
+                  <a:latin typeface="맑은 고딕" pitchFamily="50" charset="-127"/>
+                  <a:ea typeface="맑은 고딕" pitchFamily="50" charset="-127"/>
+                </a:endParaRPr>
+              </a:p>
+            </p:txBody>
+          </p:sp>
+          <p:sp>
+            <p:nvSpPr>
+              <p:cNvPr id="50" name="직사각형 49"/>
+              <p:cNvSpPr/>
+              <p:nvPr/>
+            </p:nvSpPr>
+            <p:spPr bwMode="auto">
+              <a:xfrm>
+                <a:off x="3635582" y="299982"/>
+                <a:ext cx="1807622" cy="590475"/>
+              </a:xfrm>
+              <a:prstGeom prst="rect">
+                <a:avLst/>
+              </a:prstGeom>
+              <a:solidFill>
+                <a:srgbClr val="FFC000">
+                  <a:alpha val="55000"/>
+                </a:srgbClr>
+              </a:solidFill>
+              <a:ln w="31750" cap="flat" cmpd="dbl" algn="ctr">
+                <a:solidFill>
+                  <a:schemeClr val="tx1"/>
+                </a:solidFill>
+                <a:prstDash val="solid"/>
+                <a:round/>
+                <a:headEnd type="none" w="med" len="med"/>
+                <a:tailEnd type="none" w="med" len="med"/>
+              </a:ln>
+              <a:effectLst/>
+            </p:spPr>
+            <p:txBody>
+              <a:bodyPr vert="horz" wrap="none" lIns="90000" tIns="46800" rIns="90000" bIns="46800" numCol="1" rtlCol="0" anchor="ctr" anchorCtr="0" compatLnSpc="1">
+                <a:prstTxWarp prst="textNoShape">
+                  <a:avLst/>
+                </a:prstTxWarp>
+              </a:bodyPr>
+              <a:lstStyle/>
+              <a:p>
+                <a:pPr marL="0" marR="0" indent="0" algn="ctr" defTabSz="914400" rtl="0" eaLnBrk="0" fontAlgn="base" latinLnBrk="0" hangingPunct="0">
+                  <a:lnSpc>
+                    <a:spcPct val="100000"/>
+                  </a:lnSpc>
+                  <a:spcBef>
+                    <a:spcPct val="0"/>
+                  </a:spcBef>
+                  <a:spcAft>
+                    <a:spcPct val="0"/>
+                  </a:spcAft>
+                  <a:buClrTx/>
+                  <a:buSzTx/>
+                  <a:buFontTx/>
+                  <a:buNone/>
+                  <a:tabLst/>
+                </a:pPr>
+                <a:r>
+                  <a:rPr kumimoji="0" lang="en-US" altLang="ko-KR" sz="1400" b="0" i="0" u="none" strike="noStrike" cap="none" normalizeH="0" baseline="0" dirty="0" smtClean="0">
+                    <a:ln>
+                      <a:noFill/>
+                    </a:ln>
+                    <a:solidFill>
+                      <a:schemeClr val="tx1"/>
+                    </a:solidFill>
+                    <a:effectLst/>
+                    <a:latin typeface="맑은 고딕" pitchFamily="50" charset="-127"/>
+                    <a:ea typeface="맑은 고딕" pitchFamily="50" charset="-127"/>
+                  </a:rPr>
+                  <a:t>Main</a:t>
+                </a:r>
+                <a:r>
+                  <a:rPr kumimoji="0" lang="en-US" altLang="ko-KR" sz="1400" b="0" i="0" u="none" strike="noStrike" cap="none" normalizeH="0" dirty="0" smtClean="0">
+                    <a:ln>
+                      <a:noFill/>
+                    </a:ln>
+                    <a:solidFill>
+                      <a:schemeClr val="tx1"/>
+                    </a:solidFill>
+                    <a:effectLst/>
+                    <a:latin typeface="맑은 고딕" pitchFamily="50" charset="-127"/>
+                    <a:ea typeface="맑은 고딕" pitchFamily="50" charset="-127"/>
+                  </a:rPr>
+                  <a:t> panel</a:t>
+                </a:r>
+                <a:endParaRPr kumimoji="0" lang="en-US" altLang="ko-KR" sz="1400" b="0" i="0" u="none" strike="noStrike" cap="none" normalizeH="0" baseline="0" dirty="0">
+                  <a:ln>
+                    <a:noFill/>
+                  </a:ln>
+                  <a:solidFill>
+                    <a:schemeClr val="tx1"/>
+                  </a:solidFill>
+                  <a:effectLst/>
+                  <a:latin typeface="맑은 고딕" pitchFamily="50" charset="-127"/>
+                  <a:ea typeface="맑은 고딕" pitchFamily="50" charset="-127"/>
+                </a:endParaRPr>
+              </a:p>
+            </p:txBody>
+          </p:sp>
+          <p:sp>
+            <p:nvSpPr>
+              <p:cNvPr id="51" name="직사각형 50"/>
+              <p:cNvSpPr/>
+              <p:nvPr/>
+            </p:nvSpPr>
+            <p:spPr bwMode="auto">
+              <a:xfrm>
+                <a:off x="1061133" y="1533002"/>
+                <a:ext cx="2116795" cy="585329"/>
+              </a:xfrm>
+              <a:prstGeom prst="rect">
+                <a:avLst/>
+              </a:prstGeom>
+              <a:solidFill>
+                <a:srgbClr val="FFC000">
+                  <a:alpha val="55000"/>
+                </a:srgbClr>
+              </a:solidFill>
+              <a:ln w="31750" cap="flat" cmpd="dbl" algn="ctr">
+                <a:solidFill>
+                  <a:schemeClr val="tx1"/>
+                </a:solidFill>
+                <a:prstDash val="solid"/>
+                <a:round/>
+                <a:headEnd type="none" w="med" len="med"/>
+                <a:tailEnd type="none" w="med" len="med"/>
+              </a:ln>
+              <a:effectLst/>
+            </p:spPr>
+            <p:txBody>
+              <a:bodyPr vert="horz" wrap="none" lIns="90000" tIns="46800" rIns="90000" bIns="46800" numCol="1" rtlCol="0" anchor="ctr" anchorCtr="0" compatLnSpc="1">
+                <a:prstTxWarp prst="textNoShape">
+                  <a:avLst/>
+                </a:prstTxWarp>
+              </a:bodyPr>
+              <a:lstStyle/>
+              <a:p>
+                <a:pPr marL="0" marR="0" indent="0" algn="ctr" defTabSz="914400" rtl="0" eaLnBrk="0" fontAlgn="base" latinLnBrk="0" hangingPunct="0">
+                  <a:lnSpc>
+                    <a:spcPct val="100000"/>
+                  </a:lnSpc>
+                  <a:spcBef>
+                    <a:spcPct val="0"/>
+                  </a:spcBef>
+                  <a:spcAft>
+                    <a:spcPct val="0"/>
+                  </a:spcAft>
+                  <a:buClrTx/>
+                  <a:buSzTx/>
+                  <a:buFontTx/>
+                  <a:buNone/>
+                  <a:tabLst/>
+                </a:pPr>
+                <a:r>
+                  <a:rPr lang="en-US" altLang="ko-KR" dirty="0" smtClean="0">
+                    <a:latin typeface="맑은 고딕" pitchFamily="50" charset="-127"/>
+                    <a:ea typeface="맑은 고딕" pitchFamily="50" charset="-127"/>
+                  </a:rPr>
+                  <a:t>Subject Panel</a:t>
+                </a:r>
+                <a:endParaRPr kumimoji="0" lang="en-US" altLang="ko-KR" sz="1400" b="0" i="0" u="none" strike="noStrike" cap="none" normalizeH="0" baseline="0" dirty="0">
+                  <a:ln>
+                    <a:noFill/>
+                  </a:ln>
+                  <a:solidFill>
+                    <a:schemeClr val="tx1"/>
+                  </a:solidFill>
+                  <a:effectLst/>
+                  <a:latin typeface="맑은 고딕" pitchFamily="50" charset="-127"/>
+                  <a:ea typeface="맑은 고딕" pitchFamily="50" charset="-127"/>
+                </a:endParaRPr>
+              </a:p>
+            </p:txBody>
+          </p:sp>
+          <p:sp>
+            <p:nvSpPr>
+              <p:cNvPr id="52" name="직사각형 51"/>
+              <p:cNvSpPr/>
+              <p:nvPr/>
+            </p:nvSpPr>
+            <p:spPr bwMode="auto">
+              <a:xfrm>
+                <a:off x="1061136" y="3050817"/>
+                <a:ext cx="2116795" cy="585329"/>
+              </a:xfrm>
+              <a:prstGeom prst="rect">
+                <a:avLst/>
+              </a:prstGeom>
+              <a:solidFill>
+                <a:srgbClr val="FFC000">
+                  <a:alpha val="55000"/>
+                </a:srgbClr>
+              </a:solidFill>
+              <a:ln w="31750" cap="flat" cmpd="dbl" algn="ctr">
+                <a:solidFill>
+                  <a:schemeClr val="tx1"/>
+                </a:solidFill>
+                <a:prstDash val="solid"/>
+                <a:round/>
+                <a:headEnd type="none" w="med" len="med"/>
+                <a:tailEnd type="none" w="med" len="med"/>
+              </a:ln>
+              <a:effectLst/>
+            </p:spPr>
+            <p:txBody>
+              <a:bodyPr vert="horz" wrap="none" lIns="90000" tIns="46800" rIns="90000" bIns="46800" numCol="1" rtlCol="0" anchor="ctr" anchorCtr="0" compatLnSpc="1">
+                <a:prstTxWarp prst="textNoShape">
+                  <a:avLst/>
+                </a:prstTxWarp>
+              </a:bodyPr>
+              <a:lstStyle/>
+              <a:p>
+                <a:pPr marL="0" marR="0" indent="0" algn="ctr" defTabSz="914400" rtl="0" eaLnBrk="0" fontAlgn="base" latinLnBrk="0" hangingPunct="0">
+                  <a:lnSpc>
+                    <a:spcPct val="100000"/>
+                  </a:lnSpc>
+                  <a:spcBef>
+                    <a:spcPct val="0"/>
+                  </a:spcBef>
+                  <a:spcAft>
+                    <a:spcPct val="0"/>
+                  </a:spcAft>
+                  <a:buClrTx/>
+                  <a:buSzTx/>
+                  <a:buFontTx/>
+                  <a:buNone/>
+                  <a:tabLst/>
+                </a:pPr>
+                <a:r>
+                  <a:rPr lang="ko-KR" altLang="en-US" dirty="0" smtClean="0">
+                    <a:latin typeface="맑은 고딕" pitchFamily="50" charset="-127"/>
+                    <a:ea typeface="맑은 고딕" pitchFamily="50" charset="-127"/>
+                  </a:rPr>
+                  <a:t>과목 정보 수정</a:t>
+                </a:r>
+                <a:endParaRPr kumimoji="0" lang="en-US" altLang="ko-KR" sz="1400" b="0" i="0" u="none" strike="noStrike" cap="none" normalizeH="0" baseline="0" dirty="0">
+                  <a:ln>
+                    <a:noFill/>
+                  </a:ln>
+                  <a:solidFill>
+                    <a:schemeClr val="tx1"/>
+                  </a:solidFill>
+                  <a:effectLst/>
+                  <a:latin typeface="맑은 고딕" pitchFamily="50" charset="-127"/>
+                  <a:ea typeface="맑은 고딕" pitchFamily="50" charset="-127"/>
+                </a:endParaRPr>
+              </a:p>
+            </p:txBody>
+          </p:sp>
+          <p:sp>
+            <p:nvSpPr>
+              <p:cNvPr id="53" name="직사각형 52"/>
+              <p:cNvSpPr/>
+              <p:nvPr/>
+            </p:nvSpPr>
+            <p:spPr bwMode="auto">
+              <a:xfrm>
+                <a:off x="1061138" y="2349768"/>
+                <a:ext cx="2116795" cy="585329"/>
+              </a:xfrm>
+              <a:prstGeom prst="rect">
+                <a:avLst/>
+              </a:prstGeom>
+              <a:solidFill>
+                <a:srgbClr val="FFC000">
+                  <a:alpha val="55000"/>
+                </a:srgbClr>
+              </a:solidFill>
+              <a:ln w="31750" cap="flat" cmpd="dbl" algn="ctr">
+                <a:solidFill>
+                  <a:schemeClr val="tx1"/>
+                </a:solidFill>
+                <a:prstDash val="solid"/>
+                <a:round/>
+                <a:headEnd type="none" w="med" len="med"/>
+                <a:tailEnd type="none" w="med" len="med"/>
+              </a:ln>
+              <a:effectLst/>
+            </p:spPr>
+            <p:txBody>
+              <a:bodyPr vert="horz" wrap="none" lIns="90000" tIns="46800" rIns="90000" bIns="46800" numCol="1" rtlCol="0" anchor="ctr" anchorCtr="0" compatLnSpc="1">
+                <a:prstTxWarp prst="textNoShape">
+                  <a:avLst/>
+                </a:prstTxWarp>
+              </a:bodyPr>
+              <a:lstStyle/>
+              <a:p>
+                <a:pPr marL="0" marR="0" indent="0" algn="ctr" defTabSz="914400" rtl="0" eaLnBrk="0" fontAlgn="base" latinLnBrk="0" hangingPunct="0">
+                  <a:lnSpc>
+                    <a:spcPct val="100000"/>
+                  </a:lnSpc>
+                  <a:spcBef>
+                    <a:spcPct val="0"/>
+                  </a:spcBef>
+                  <a:spcAft>
+                    <a:spcPct val="0"/>
+                  </a:spcAft>
+                  <a:buClrTx/>
+                  <a:buSzTx/>
+                  <a:buFontTx/>
+                  <a:buNone/>
+                  <a:tabLst/>
+                </a:pPr>
+                <a:r>
+                  <a:rPr lang="ko-KR" altLang="en-US" dirty="0" smtClean="0">
+                    <a:latin typeface="맑은 고딕" pitchFamily="50" charset="-127"/>
+                    <a:ea typeface="맑은 고딕" pitchFamily="50" charset="-127"/>
+                  </a:rPr>
+                  <a:t>과목</a:t>
+                </a:r>
+                <a:r>
+                  <a:rPr lang="en-US" altLang="ko-KR" dirty="0" smtClean="0">
+                    <a:latin typeface="맑은 고딕" pitchFamily="50" charset="-127"/>
+                    <a:ea typeface="맑은 고딕" pitchFamily="50" charset="-127"/>
+                  </a:rPr>
+                  <a:t> </a:t>
+                </a:r>
+                <a:r>
+                  <a:rPr lang="ko-KR" altLang="en-US" dirty="0" smtClean="0">
+                    <a:latin typeface="맑은 고딕" pitchFamily="50" charset="-127"/>
+                    <a:ea typeface="맑은 고딕" pitchFamily="50" charset="-127"/>
+                  </a:rPr>
+                  <a:t>정보 추가 </a:t>
+                </a:r>
+                <a:endParaRPr kumimoji="0" lang="en-US" altLang="ko-KR" sz="1400" b="0" i="0" u="none" strike="noStrike" cap="none" normalizeH="0" baseline="0" dirty="0">
+                  <a:ln>
+                    <a:noFill/>
+                  </a:ln>
+                  <a:solidFill>
+                    <a:schemeClr val="tx1"/>
+                  </a:solidFill>
+                  <a:effectLst/>
+                  <a:latin typeface="맑은 고딕" pitchFamily="50" charset="-127"/>
+                  <a:ea typeface="맑은 고딕" pitchFamily="50" charset="-127"/>
+                </a:endParaRPr>
+              </a:p>
+            </p:txBody>
+          </p:sp>
+          <p:sp>
+            <p:nvSpPr>
+              <p:cNvPr id="54" name="직사각형 53"/>
+              <p:cNvSpPr/>
+              <p:nvPr/>
+            </p:nvSpPr>
+            <p:spPr bwMode="auto">
+              <a:xfrm>
+                <a:off x="1061133" y="3750279"/>
+                <a:ext cx="2116795" cy="585329"/>
+              </a:xfrm>
+              <a:prstGeom prst="rect">
+                <a:avLst/>
+              </a:prstGeom>
+              <a:solidFill>
+                <a:srgbClr val="FFC000">
+                  <a:alpha val="55000"/>
+                </a:srgbClr>
+              </a:solidFill>
+              <a:ln w="31750" cap="flat" cmpd="dbl" algn="ctr">
+                <a:solidFill>
+                  <a:schemeClr val="tx1"/>
+                </a:solidFill>
+                <a:prstDash val="solid"/>
+                <a:round/>
+                <a:headEnd type="none" w="med" len="med"/>
+                <a:tailEnd type="none" w="med" len="med"/>
+              </a:ln>
+              <a:effectLst/>
+            </p:spPr>
+            <p:txBody>
+              <a:bodyPr vert="horz" wrap="none" lIns="90000" tIns="46800" rIns="90000" bIns="46800" numCol="1" rtlCol="0" anchor="ctr" anchorCtr="0" compatLnSpc="1">
+                <a:prstTxWarp prst="textNoShape">
+                  <a:avLst/>
+                </a:prstTxWarp>
+              </a:bodyPr>
+              <a:lstStyle/>
+              <a:p>
+                <a:pPr algn="ctr"/>
+                <a:r>
+                  <a:rPr lang="ko-KR" altLang="en-US" dirty="0" smtClean="0">
+                    <a:latin typeface="맑은 고딕" pitchFamily="50" charset="-127"/>
+                    <a:ea typeface="맑은 고딕" pitchFamily="50" charset="-127"/>
+                  </a:rPr>
+                  <a:t>과목리스트 저장</a:t>
+                </a:r>
+                <a:endParaRPr lang="en-US" altLang="ko-KR" dirty="0">
+                  <a:latin typeface="맑은 고딕" pitchFamily="50" charset="-127"/>
+                  <a:ea typeface="맑은 고딕" pitchFamily="50" charset="-127"/>
+                </a:endParaRPr>
+              </a:p>
+            </p:txBody>
+          </p:sp>
+          <p:sp>
+            <p:nvSpPr>
+              <p:cNvPr id="55" name="직사각형 54"/>
+              <p:cNvSpPr/>
+              <p:nvPr/>
+            </p:nvSpPr>
+            <p:spPr bwMode="auto">
+              <a:xfrm>
+                <a:off x="1061133" y="4454498"/>
+                <a:ext cx="2116795" cy="585329"/>
+              </a:xfrm>
+              <a:prstGeom prst="rect">
+                <a:avLst/>
+              </a:prstGeom>
+              <a:solidFill>
+                <a:srgbClr val="FFC000">
+                  <a:alpha val="55000"/>
+                </a:srgbClr>
+              </a:solidFill>
+              <a:ln w="31750" cap="flat" cmpd="dbl" algn="ctr">
+                <a:solidFill>
+                  <a:schemeClr val="tx1"/>
+                </a:solidFill>
+                <a:prstDash val="solid"/>
+                <a:round/>
+                <a:headEnd type="none" w="med" len="med"/>
+                <a:tailEnd type="none" w="med" len="med"/>
+              </a:ln>
+              <a:effectLst/>
+            </p:spPr>
+            <p:txBody>
+              <a:bodyPr vert="horz" wrap="none" lIns="90000" tIns="46800" rIns="90000" bIns="46800" numCol="1" rtlCol="0" anchor="ctr" anchorCtr="0" compatLnSpc="1">
+                <a:prstTxWarp prst="textNoShape">
+                  <a:avLst/>
+                </a:prstTxWarp>
+              </a:bodyPr>
+              <a:lstStyle/>
+              <a:p>
+                <a:pPr marL="0" marR="0" indent="0" algn="ctr" defTabSz="914400" rtl="0" eaLnBrk="0" fontAlgn="base" latinLnBrk="0" hangingPunct="0">
+                  <a:lnSpc>
+                    <a:spcPct val="100000"/>
+                  </a:lnSpc>
+                  <a:spcBef>
+                    <a:spcPct val="0"/>
+                  </a:spcBef>
+                  <a:spcAft>
+                    <a:spcPct val="0"/>
+                  </a:spcAft>
+                  <a:buClrTx/>
+                  <a:buSzTx/>
+                  <a:buFontTx/>
+                  <a:buNone/>
+                  <a:tabLst/>
+                </a:pPr>
+                <a:r>
+                  <a:rPr kumimoji="0" lang="ko-KR" altLang="en-US" sz="1400" b="0" i="0" u="none" strike="noStrike" cap="none" normalizeH="0" baseline="0" dirty="0" smtClean="0">
+                    <a:ln>
+                      <a:noFill/>
+                    </a:ln>
+                    <a:solidFill>
+                      <a:schemeClr val="tx1"/>
+                    </a:solidFill>
+                    <a:effectLst/>
+                    <a:latin typeface="맑은 고딕" pitchFamily="50" charset="-127"/>
+                    <a:ea typeface="맑은 고딕" pitchFamily="50" charset="-127"/>
+                  </a:rPr>
+                  <a:t>과목리스트 불러오기</a:t>
+                </a:r>
+                <a:endParaRPr kumimoji="0" lang="en-US" altLang="ko-KR" sz="1400" b="0" i="0" u="none" strike="noStrike" cap="none" normalizeH="0" baseline="0" dirty="0">
+                  <a:ln>
+                    <a:noFill/>
+                  </a:ln>
+                  <a:solidFill>
+                    <a:schemeClr val="tx1"/>
+                  </a:solidFill>
+                  <a:effectLst/>
+                  <a:latin typeface="맑은 고딕" pitchFamily="50" charset="-127"/>
+                  <a:ea typeface="맑은 고딕" pitchFamily="50" charset="-127"/>
+                </a:endParaRPr>
+              </a:p>
+            </p:txBody>
+          </p:sp>
+          <p:sp>
+            <p:nvSpPr>
+              <p:cNvPr id="56" name="직사각형 55"/>
+              <p:cNvSpPr/>
+              <p:nvPr/>
+            </p:nvSpPr>
+            <p:spPr bwMode="auto">
+              <a:xfrm>
+                <a:off x="1061133" y="5153960"/>
+                <a:ext cx="2116795" cy="585329"/>
+              </a:xfrm>
+              <a:prstGeom prst="rect">
+                <a:avLst/>
+              </a:prstGeom>
+              <a:solidFill>
+                <a:srgbClr val="FFC000">
+                  <a:alpha val="55000"/>
+                </a:srgbClr>
+              </a:solidFill>
+              <a:ln w="31750" cap="flat" cmpd="dbl" algn="ctr">
+                <a:solidFill>
+                  <a:schemeClr val="tx1"/>
+                </a:solidFill>
+                <a:prstDash val="solid"/>
+                <a:round/>
+                <a:headEnd type="none" w="med" len="med"/>
+                <a:tailEnd type="none" w="med" len="med"/>
+              </a:ln>
+              <a:effectLst/>
+            </p:spPr>
+            <p:txBody>
+              <a:bodyPr vert="horz" wrap="none" lIns="90000" tIns="46800" rIns="90000" bIns="46800" numCol="1" rtlCol="0" anchor="ctr" anchorCtr="0" compatLnSpc="1">
+                <a:prstTxWarp prst="textNoShape">
+                  <a:avLst/>
+                </a:prstTxWarp>
+              </a:bodyPr>
+              <a:lstStyle/>
+              <a:p>
+                <a:pPr marL="0" marR="0" indent="0" algn="ctr" defTabSz="914400" rtl="0" eaLnBrk="0" fontAlgn="base" latinLnBrk="0" hangingPunct="0">
+                  <a:lnSpc>
+                    <a:spcPct val="100000"/>
+                  </a:lnSpc>
+                  <a:spcBef>
+                    <a:spcPct val="0"/>
+                  </a:spcBef>
+                  <a:spcAft>
+                    <a:spcPct val="0"/>
+                  </a:spcAft>
+                  <a:buClrTx/>
+                  <a:buSzTx/>
+                  <a:buFontTx/>
+                  <a:buNone/>
+                  <a:tabLst/>
+                </a:pPr>
+                <a:r>
+                  <a:rPr lang="ko-KR" altLang="en-US" dirty="0" smtClean="0">
+                    <a:latin typeface="맑은 고딕" pitchFamily="50" charset="-127"/>
+                    <a:ea typeface="맑은 고딕" pitchFamily="50" charset="-127"/>
+                  </a:rPr>
+                  <a:t>과목 리스트 출력</a:t>
+                </a:r>
+                <a:endParaRPr kumimoji="0" lang="en-US" altLang="ko-KR" sz="1400" b="0" i="0" u="none" strike="noStrike" cap="none" normalizeH="0" baseline="0" dirty="0">
+                  <a:ln>
+                    <a:noFill/>
+                  </a:ln>
+                  <a:solidFill>
+                    <a:schemeClr val="tx1"/>
+                  </a:solidFill>
+                  <a:effectLst/>
+                  <a:latin typeface="맑은 고딕" pitchFamily="50" charset="-127"/>
+                  <a:ea typeface="맑은 고딕" pitchFamily="50" charset="-127"/>
+                </a:endParaRPr>
+              </a:p>
+            </p:txBody>
+          </p:sp>
+          <p:sp>
+            <p:nvSpPr>
+              <p:cNvPr id="57" name="직사각형 56"/>
+              <p:cNvSpPr/>
+              <p:nvPr/>
+            </p:nvSpPr>
+            <p:spPr bwMode="auto">
+              <a:xfrm>
+                <a:off x="1061133" y="5851836"/>
+                <a:ext cx="2116795" cy="585329"/>
+              </a:xfrm>
+              <a:prstGeom prst="rect">
+                <a:avLst/>
+              </a:prstGeom>
+              <a:solidFill>
+                <a:srgbClr val="FFC000">
+                  <a:alpha val="55000"/>
+                </a:srgbClr>
+              </a:solidFill>
+              <a:ln w="31750" cap="flat" cmpd="dbl" algn="ctr">
+                <a:solidFill>
+                  <a:schemeClr val="tx1"/>
+                </a:solidFill>
+                <a:prstDash val="solid"/>
+                <a:round/>
+                <a:headEnd type="none" w="med" len="med"/>
+                <a:tailEnd type="none" w="med" len="med"/>
+              </a:ln>
+              <a:effectLst/>
+            </p:spPr>
+            <p:txBody>
+              <a:bodyPr vert="horz" wrap="none" lIns="90000" tIns="46800" rIns="90000" bIns="46800" numCol="1" rtlCol="0" anchor="ctr" anchorCtr="0" compatLnSpc="1">
+                <a:prstTxWarp prst="textNoShape">
+                  <a:avLst/>
+                </a:prstTxWarp>
+              </a:bodyPr>
+              <a:lstStyle/>
+              <a:p>
+                <a:pPr marL="0" marR="0" indent="0" algn="ctr" defTabSz="914400" rtl="0" eaLnBrk="0" fontAlgn="base" latinLnBrk="0" hangingPunct="0">
+                  <a:lnSpc>
+                    <a:spcPct val="100000"/>
+                  </a:lnSpc>
+                  <a:spcBef>
+                    <a:spcPct val="0"/>
+                  </a:spcBef>
+                  <a:spcAft>
+                    <a:spcPct val="0"/>
+                  </a:spcAft>
+                  <a:buClrTx/>
+                  <a:buSzTx/>
+                  <a:buFontTx/>
+                  <a:buNone/>
+                  <a:tabLst/>
+                </a:pPr>
+                <a:r>
+                  <a:rPr lang="ko-KR" altLang="en-US" dirty="0" smtClean="0">
+                    <a:latin typeface="맑은 고딕" pitchFamily="50" charset="-127"/>
+                    <a:ea typeface="맑은 고딕" pitchFamily="50" charset="-127"/>
+                  </a:rPr>
+                  <a:t>과목 리스트 삭제</a:t>
+                </a:r>
+                <a:endParaRPr kumimoji="0" lang="en-US" altLang="ko-KR" sz="1400" b="0" i="0" u="none" strike="noStrike" cap="none" normalizeH="0" baseline="0" dirty="0">
+                  <a:ln>
+                    <a:noFill/>
+                  </a:ln>
+                  <a:solidFill>
+                    <a:schemeClr val="tx1"/>
+                  </a:solidFill>
+                  <a:effectLst/>
+                  <a:latin typeface="맑은 고딕" pitchFamily="50" charset="-127"/>
+                  <a:ea typeface="맑은 고딕" pitchFamily="50" charset="-127"/>
+                </a:endParaRPr>
+              </a:p>
+            </p:txBody>
+          </p:sp>
+          <p:sp>
+            <p:nvSpPr>
+              <p:cNvPr id="58" name="직사각형 57"/>
+              <p:cNvSpPr/>
+              <p:nvPr/>
+            </p:nvSpPr>
+            <p:spPr bwMode="auto">
+              <a:xfrm>
+                <a:off x="5594484" y="2371883"/>
+                <a:ext cx="1829317" cy="589976"/>
+              </a:xfrm>
+              <a:prstGeom prst="rect">
+                <a:avLst/>
+              </a:prstGeom>
+              <a:solidFill>
+                <a:srgbClr val="FFC000">
+                  <a:alpha val="55000"/>
+                </a:srgbClr>
+              </a:solidFill>
+              <a:ln w="31750" cap="flat" cmpd="dbl" algn="ctr">
+                <a:solidFill>
+                  <a:schemeClr val="tx1"/>
+                </a:solidFill>
+                <a:prstDash val="solid"/>
+                <a:round/>
+                <a:headEnd type="none" w="med" len="med"/>
+                <a:tailEnd type="none" w="med" len="med"/>
+              </a:ln>
+              <a:effectLst/>
+            </p:spPr>
+            <p:txBody>
+              <a:bodyPr vert="horz" wrap="none" lIns="90000" tIns="46800" rIns="90000" bIns="46800" numCol="1" rtlCol="0" anchor="ctr" anchorCtr="0" compatLnSpc="1">
+                <a:prstTxWarp prst="textNoShape">
+                  <a:avLst/>
+                </a:prstTxWarp>
+              </a:bodyPr>
+              <a:lstStyle/>
+              <a:p>
+                <a:pPr marL="0" marR="0" indent="0" algn="ctr" defTabSz="914400" rtl="0" eaLnBrk="0" fontAlgn="base" latinLnBrk="0" hangingPunct="0">
+                  <a:lnSpc>
+                    <a:spcPct val="100000"/>
+                  </a:lnSpc>
+                  <a:spcBef>
+                    <a:spcPct val="0"/>
+                  </a:spcBef>
+                  <a:spcAft>
+                    <a:spcPct val="0"/>
+                  </a:spcAft>
+                  <a:buClrTx/>
+                  <a:buSzTx/>
+                  <a:buFontTx/>
+                  <a:buNone/>
+                  <a:tabLst/>
+                </a:pPr>
+                <a:r>
+                  <a:rPr lang="ko-KR" altLang="en-US" dirty="0" smtClean="0">
+                    <a:latin typeface="맑은 고딕" pitchFamily="50" charset="-127"/>
+                    <a:ea typeface="맑은 고딕" pitchFamily="50" charset="-127"/>
+                  </a:rPr>
+                  <a:t>강의 명 리스트 출력</a:t>
+                </a:r>
+                <a:endParaRPr kumimoji="0" lang="en-US" altLang="ko-KR" sz="1400" b="0" i="0" u="none" strike="noStrike" cap="none" normalizeH="0" baseline="0" dirty="0">
+                  <a:ln>
+                    <a:noFill/>
+                  </a:ln>
+                  <a:solidFill>
+                    <a:schemeClr val="tx1"/>
+                  </a:solidFill>
+                  <a:effectLst/>
+                  <a:latin typeface="맑은 고딕" pitchFamily="50" charset="-127"/>
+                  <a:ea typeface="맑은 고딕" pitchFamily="50" charset="-127"/>
+                </a:endParaRPr>
+              </a:p>
+            </p:txBody>
+          </p:sp>
+          <p:sp>
+            <p:nvSpPr>
+              <p:cNvPr id="59" name="직사각형 58"/>
+              <p:cNvSpPr/>
+              <p:nvPr/>
+            </p:nvSpPr>
+            <p:spPr bwMode="auto">
+              <a:xfrm>
+                <a:off x="3624735" y="1533002"/>
+                <a:ext cx="1829317" cy="589976"/>
+              </a:xfrm>
+              <a:prstGeom prst="rect">
+                <a:avLst/>
+              </a:prstGeom>
+              <a:solidFill>
+                <a:srgbClr val="FFC000">
+                  <a:alpha val="55000"/>
+                </a:srgbClr>
+              </a:solidFill>
+              <a:ln w="31750" cap="flat" cmpd="dbl" algn="ctr">
+                <a:solidFill>
+                  <a:schemeClr val="tx1"/>
+                </a:solidFill>
+                <a:prstDash val="solid"/>
+                <a:round/>
+                <a:headEnd type="none" w="med" len="med"/>
+                <a:tailEnd type="none" w="med" len="med"/>
+              </a:ln>
+              <a:effectLst/>
+            </p:spPr>
+            <p:txBody>
+              <a:bodyPr vert="horz" wrap="none" lIns="90000" tIns="46800" rIns="90000" bIns="46800" numCol="1" rtlCol="0" anchor="ctr" anchorCtr="0" compatLnSpc="1">
+                <a:prstTxWarp prst="textNoShape">
+                  <a:avLst/>
+                </a:prstTxWarp>
+              </a:bodyPr>
+              <a:lstStyle/>
+              <a:p>
+                <a:pPr marL="0" marR="0" indent="0" algn="ctr" defTabSz="914400" rtl="0" eaLnBrk="0" fontAlgn="base" latinLnBrk="0" hangingPunct="0">
+                  <a:lnSpc>
+                    <a:spcPct val="100000"/>
+                  </a:lnSpc>
+                  <a:spcBef>
+                    <a:spcPct val="0"/>
+                  </a:spcBef>
+                  <a:spcAft>
+                    <a:spcPct val="0"/>
+                  </a:spcAft>
+                  <a:buClrTx/>
+                  <a:buSzTx/>
+                  <a:buFontTx/>
+                  <a:buNone/>
+                  <a:tabLst/>
+                </a:pPr>
+                <a:r>
+                  <a:rPr lang="en-US" altLang="ko-KR" dirty="0" err="1" smtClean="0">
+                    <a:latin typeface="맑은 고딕" pitchFamily="50" charset="-127"/>
+                    <a:ea typeface="맑은 고딕" pitchFamily="50" charset="-127"/>
+                  </a:rPr>
+                  <a:t>Todolist</a:t>
+                </a:r>
+                <a:r>
+                  <a:rPr lang="en-US" altLang="ko-KR" dirty="0" smtClean="0">
+                    <a:latin typeface="맑은 고딕" pitchFamily="50" charset="-127"/>
+                    <a:ea typeface="맑은 고딕" pitchFamily="50" charset="-127"/>
+                  </a:rPr>
+                  <a:t> Panel</a:t>
+                </a:r>
+                <a:endParaRPr kumimoji="0" lang="en-US" altLang="ko-KR" sz="1400" b="0" i="0" u="none" strike="noStrike" cap="none" normalizeH="0" baseline="0" dirty="0">
+                  <a:ln>
+                    <a:noFill/>
+                  </a:ln>
+                  <a:solidFill>
+                    <a:schemeClr val="tx1"/>
+                  </a:solidFill>
+                  <a:effectLst/>
+                  <a:latin typeface="맑은 고딕" pitchFamily="50" charset="-127"/>
+                  <a:ea typeface="맑은 고딕" pitchFamily="50" charset="-127"/>
+                </a:endParaRPr>
+              </a:p>
+            </p:txBody>
+          </p:sp>
+          <p:sp>
+            <p:nvSpPr>
+              <p:cNvPr id="60" name="직사각형 59"/>
+              <p:cNvSpPr/>
+              <p:nvPr/>
+            </p:nvSpPr>
+            <p:spPr bwMode="auto">
+              <a:xfrm>
+                <a:off x="3624739" y="3041141"/>
+                <a:ext cx="1829317" cy="589976"/>
+              </a:xfrm>
+              <a:prstGeom prst="rect">
+                <a:avLst/>
+              </a:prstGeom>
+              <a:solidFill>
+                <a:srgbClr val="FFC000">
+                  <a:alpha val="55000"/>
+                </a:srgbClr>
+              </a:solidFill>
+              <a:ln w="31750" cap="flat" cmpd="dbl" algn="ctr">
+                <a:solidFill>
+                  <a:schemeClr val="tx1"/>
+                </a:solidFill>
+                <a:prstDash val="solid"/>
+                <a:round/>
+                <a:headEnd type="none" w="med" len="med"/>
+                <a:tailEnd type="none" w="med" len="med"/>
+              </a:ln>
+              <a:effectLst/>
+            </p:spPr>
+            <p:txBody>
+              <a:bodyPr vert="horz" wrap="none" lIns="90000" tIns="46800" rIns="90000" bIns="46800" numCol="1" rtlCol="0" anchor="ctr" anchorCtr="0" compatLnSpc="1">
+                <a:prstTxWarp prst="textNoShape">
+                  <a:avLst/>
+                </a:prstTxWarp>
+              </a:bodyPr>
+              <a:lstStyle/>
+              <a:p>
+                <a:pPr marL="0" marR="0" indent="0" algn="ctr" defTabSz="914400" rtl="0" eaLnBrk="0" fontAlgn="base" latinLnBrk="0" hangingPunct="0">
+                  <a:lnSpc>
+                    <a:spcPct val="100000"/>
+                  </a:lnSpc>
+                  <a:spcBef>
+                    <a:spcPct val="0"/>
+                  </a:spcBef>
+                  <a:spcAft>
+                    <a:spcPct val="0"/>
+                  </a:spcAft>
+                  <a:buClrTx/>
+                  <a:buSzTx/>
+                  <a:buFontTx/>
+                  <a:buNone/>
+                  <a:tabLst/>
+                </a:pPr>
+                <a:r>
+                  <a:rPr lang="en-US" altLang="ko-KR" dirty="0" err="1" smtClean="0">
+                    <a:latin typeface="맑은 고딕" pitchFamily="50" charset="-127"/>
+                    <a:ea typeface="맑은 고딕" pitchFamily="50" charset="-127"/>
+                  </a:rPr>
+                  <a:t>Todo</a:t>
+                </a:r>
+                <a:r>
+                  <a:rPr lang="en-US" altLang="ko-KR" dirty="0">
+                    <a:latin typeface="맑은 고딕" pitchFamily="50" charset="-127"/>
+                    <a:ea typeface="맑은 고딕" pitchFamily="50" charset="-127"/>
+                  </a:rPr>
+                  <a:t> </a:t>
+                </a:r>
+                <a:r>
+                  <a:rPr lang="ko-KR" altLang="en-US" dirty="0" smtClean="0">
+                    <a:latin typeface="맑은 고딕" pitchFamily="50" charset="-127"/>
+                    <a:ea typeface="맑은 고딕" pitchFamily="50" charset="-127"/>
+                  </a:rPr>
+                  <a:t>정보 수정</a:t>
+                </a:r>
+                <a:endParaRPr kumimoji="0" lang="en-US" altLang="ko-KR" sz="1400" b="0" i="0" u="none" strike="noStrike" cap="none" normalizeH="0" baseline="0" dirty="0">
+                  <a:ln>
+                    <a:noFill/>
+                  </a:ln>
+                  <a:solidFill>
+                    <a:schemeClr val="tx1"/>
+                  </a:solidFill>
+                  <a:effectLst/>
+                  <a:latin typeface="맑은 고딕" pitchFamily="50" charset="-127"/>
+                  <a:ea typeface="맑은 고딕" pitchFamily="50" charset="-127"/>
+                </a:endParaRPr>
+              </a:p>
+            </p:txBody>
+          </p:sp>
+          <p:sp>
+            <p:nvSpPr>
+              <p:cNvPr id="61" name="직사각형 60"/>
+              <p:cNvSpPr/>
+              <p:nvPr/>
+            </p:nvSpPr>
+            <p:spPr bwMode="auto">
+              <a:xfrm>
+                <a:off x="3624740" y="2334527"/>
+                <a:ext cx="1829317" cy="589976"/>
+              </a:xfrm>
+              <a:prstGeom prst="rect">
+                <a:avLst/>
+              </a:prstGeom>
+              <a:solidFill>
+                <a:srgbClr val="FFC000">
+                  <a:alpha val="55000"/>
+                </a:srgbClr>
+              </a:solidFill>
+              <a:ln w="31750" cap="flat" cmpd="dbl" algn="ctr">
+                <a:solidFill>
+                  <a:schemeClr val="tx1"/>
+                </a:solidFill>
+                <a:prstDash val="solid"/>
+                <a:round/>
+                <a:headEnd type="none" w="med" len="med"/>
+                <a:tailEnd type="none" w="med" len="med"/>
+              </a:ln>
+              <a:effectLst/>
+            </p:spPr>
+            <p:txBody>
+              <a:bodyPr vert="horz" wrap="none" lIns="90000" tIns="46800" rIns="90000" bIns="46800" numCol="1" rtlCol="0" anchor="ctr" anchorCtr="0" compatLnSpc="1">
+                <a:prstTxWarp prst="textNoShape">
+                  <a:avLst/>
+                </a:prstTxWarp>
+              </a:bodyPr>
+              <a:lstStyle/>
+              <a:p>
+                <a:pPr marL="0" marR="0" indent="0" algn="ctr" defTabSz="914400" rtl="0" eaLnBrk="0" fontAlgn="base" latinLnBrk="0" hangingPunct="0">
+                  <a:lnSpc>
+                    <a:spcPct val="100000"/>
+                  </a:lnSpc>
+                  <a:spcBef>
+                    <a:spcPct val="0"/>
+                  </a:spcBef>
+                  <a:spcAft>
+                    <a:spcPct val="0"/>
+                  </a:spcAft>
+                  <a:buClrTx/>
+                  <a:buSzTx/>
+                  <a:buFontTx/>
+                  <a:buNone/>
+                  <a:tabLst/>
+                </a:pPr>
+                <a:r>
+                  <a:rPr lang="en-US" altLang="ko-KR" dirty="0" err="1" smtClean="0">
+                    <a:latin typeface="맑은 고딕" pitchFamily="50" charset="-127"/>
+                    <a:ea typeface="맑은 고딕" pitchFamily="50" charset="-127"/>
+                  </a:rPr>
+                  <a:t>Todo</a:t>
+                </a:r>
+                <a:r>
+                  <a:rPr lang="en-US" altLang="ko-KR" dirty="0" smtClean="0">
+                    <a:latin typeface="맑은 고딕" pitchFamily="50" charset="-127"/>
+                    <a:ea typeface="맑은 고딕" pitchFamily="50" charset="-127"/>
+                  </a:rPr>
+                  <a:t> </a:t>
+                </a:r>
+                <a:r>
+                  <a:rPr lang="ko-KR" altLang="en-US" dirty="0" smtClean="0">
+                    <a:latin typeface="맑은 고딕" pitchFamily="50" charset="-127"/>
+                    <a:ea typeface="맑은 고딕" pitchFamily="50" charset="-127"/>
+                  </a:rPr>
+                  <a:t>정보 추가</a:t>
+                </a:r>
+                <a:endParaRPr kumimoji="0" lang="en-US" altLang="ko-KR" sz="1400" b="0" i="0" u="none" strike="noStrike" cap="none" normalizeH="0" baseline="0" dirty="0">
+                  <a:ln>
+                    <a:noFill/>
+                  </a:ln>
+                  <a:solidFill>
+                    <a:schemeClr val="tx1"/>
+                  </a:solidFill>
+                  <a:effectLst/>
+                  <a:latin typeface="맑은 고딕" pitchFamily="50" charset="-127"/>
+                  <a:ea typeface="맑은 고딕" pitchFamily="50" charset="-127"/>
+                </a:endParaRPr>
+              </a:p>
+            </p:txBody>
+          </p:sp>
+          <p:sp>
+            <p:nvSpPr>
+              <p:cNvPr id="62" name="직사각형 61"/>
+              <p:cNvSpPr/>
+              <p:nvPr/>
+            </p:nvSpPr>
+            <p:spPr bwMode="auto">
+              <a:xfrm>
+                <a:off x="3624736" y="3747755"/>
+                <a:ext cx="1829317" cy="589976"/>
+              </a:xfrm>
+              <a:prstGeom prst="rect">
+                <a:avLst/>
+              </a:prstGeom>
+              <a:solidFill>
+                <a:srgbClr val="FFC000">
+                  <a:alpha val="55000"/>
+                </a:srgbClr>
+              </a:solidFill>
+              <a:ln w="31750" cap="flat" cmpd="dbl" algn="ctr">
+                <a:solidFill>
+                  <a:schemeClr val="tx1"/>
+                </a:solidFill>
+                <a:prstDash val="solid"/>
+                <a:round/>
+                <a:headEnd type="none" w="med" len="med"/>
+                <a:tailEnd type="none" w="med" len="med"/>
+              </a:ln>
+              <a:effectLst/>
+            </p:spPr>
+            <p:txBody>
+              <a:bodyPr vert="horz" wrap="none" lIns="90000" tIns="46800" rIns="90000" bIns="46800" numCol="1" rtlCol="0" anchor="ctr" anchorCtr="0" compatLnSpc="1">
+                <a:prstTxWarp prst="textNoShape">
+                  <a:avLst/>
+                </a:prstTxWarp>
+              </a:bodyPr>
+              <a:lstStyle/>
+              <a:p>
+                <a:pPr algn="ctr"/>
+                <a:r>
+                  <a:rPr lang="en-US" altLang="ko-KR" dirty="0" err="1" smtClean="0">
+                    <a:latin typeface="맑은 고딕" pitchFamily="50" charset="-127"/>
+                    <a:ea typeface="맑은 고딕" pitchFamily="50" charset="-127"/>
+                  </a:rPr>
+                  <a:t>Todo</a:t>
+                </a:r>
+                <a:r>
+                  <a:rPr lang="ko-KR" altLang="en-US" dirty="0" smtClean="0">
+                    <a:latin typeface="맑은 고딕" pitchFamily="50" charset="-127"/>
+                    <a:ea typeface="맑은 고딕" pitchFamily="50" charset="-127"/>
+                  </a:rPr>
+                  <a:t>정보 리스트 저장</a:t>
+                </a:r>
+                <a:endParaRPr lang="en-US" altLang="ko-KR" dirty="0">
+                  <a:latin typeface="맑은 고딕" pitchFamily="50" charset="-127"/>
+                  <a:ea typeface="맑은 고딕" pitchFamily="50" charset="-127"/>
+                </a:endParaRPr>
+              </a:p>
+            </p:txBody>
+          </p:sp>
+          <p:sp>
+            <p:nvSpPr>
+              <p:cNvPr id="63" name="직사각형 62"/>
+              <p:cNvSpPr/>
+              <p:nvPr/>
+            </p:nvSpPr>
+            <p:spPr bwMode="auto">
+              <a:xfrm>
+                <a:off x="3624736" y="4455967"/>
+                <a:ext cx="1829317" cy="589976"/>
+              </a:xfrm>
+              <a:prstGeom prst="rect">
+                <a:avLst/>
+              </a:prstGeom>
+              <a:solidFill>
+                <a:srgbClr val="FFC000">
+                  <a:alpha val="55000"/>
+                </a:srgbClr>
+              </a:solidFill>
+              <a:ln w="31750" cap="flat" cmpd="dbl" algn="ctr">
+                <a:solidFill>
+                  <a:schemeClr val="tx1"/>
+                </a:solidFill>
+                <a:prstDash val="solid"/>
+                <a:round/>
+                <a:headEnd type="none" w="med" len="med"/>
+                <a:tailEnd type="none" w="med" len="med"/>
+              </a:ln>
+              <a:effectLst/>
+            </p:spPr>
+            <p:txBody>
+              <a:bodyPr vert="horz" wrap="none" lIns="90000" tIns="46800" rIns="90000" bIns="46800" numCol="1" rtlCol="0" anchor="ctr" anchorCtr="0" compatLnSpc="1">
+                <a:prstTxWarp prst="textNoShape">
+                  <a:avLst/>
+                </a:prstTxWarp>
+              </a:bodyPr>
+              <a:lstStyle/>
+              <a:p>
+                <a:pPr algn="ctr"/>
+                <a:r>
+                  <a:rPr lang="en-US" altLang="ko-KR" dirty="0" err="1">
+                    <a:latin typeface="맑은 고딕" pitchFamily="50" charset="-127"/>
+                    <a:ea typeface="맑은 고딕" pitchFamily="50" charset="-127"/>
+                  </a:rPr>
+                  <a:t>Todo</a:t>
+                </a:r>
+                <a:r>
+                  <a:rPr lang="ko-KR" altLang="en-US" dirty="0">
+                    <a:latin typeface="맑은 고딕" pitchFamily="50" charset="-127"/>
+                    <a:ea typeface="맑은 고딕" pitchFamily="50" charset="-127"/>
+                  </a:rPr>
+                  <a:t>정보 </a:t>
+                </a:r>
+                <a:r>
+                  <a:rPr lang="ko-KR" altLang="en-US" dirty="0" smtClean="0">
+                    <a:latin typeface="맑은 고딕" pitchFamily="50" charset="-127"/>
+                    <a:ea typeface="맑은 고딕" pitchFamily="50" charset="-127"/>
+                  </a:rPr>
+                  <a:t>리스트</a:t>
+                </a:r>
+                <a:endParaRPr lang="en-US" altLang="ko-KR" dirty="0" smtClean="0">
+                  <a:latin typeface="맑은 고딕" pitchFamily="50" charset="-127"/>
+                  <a:ea typeface="맑은 고딕" pitchFamily="50" charset="-127"/>
+                </a:endParaRPr>
+              </a:p>
+              <a:p>
+                <a:pPr algn="ctr"/>
+                <a:r>
+                  <a:rPr kumimoji="0" lang="ko-KR" altLang="en-US" sz="1400" b="0" i="0" u="none" strike="noStrike" cap="none" normalizeH="0" baseline="0" dirty="0" smtClean="0">
+                    <a:ln>
+                      <a:noFill/>
+                    </a:ln>
+                    <a:solidFill>
+                      <a:schemeClr val="tx1"/>
+                    </a:solidFill>
+                    <a:effectLst/>
+                    <a:latin typeface="맑은 고딕" pitchFamily="50" charset="-127"/>
+                    <a:ea typeface="맑은 고딕" pitchFamily="50" charset="-127"/>
+                  </a:rPr>
+                  <a:t>불러오기</a:t>
+                </a:r>
+                <a:endParaRPr kumimoji="0" lang="en-US" altLang="ko-KR" sz="1400" b="0" i="0" u="none" strike="noStrike" cap="none" normalizeH="0" baseline="0" dirty="0">
+                  <a:ln>
+                    <a:noFill/>
+                  </a:ln>
+                  <a:solidFill>
+                    <a:schemeClr val="tx1"/>
+                  </a:solidFill>
+                  <a:effectLst/>
+                  <a:latin typeface="맑은 고딕" pitchFamily="50" charset="-127"/>
+                  <a:ea typeface="맑은 고딕" pitchFamily="50" charset="-127"/>
+                </a:endParaRPr>
+              </a:p>
+            </p:txBody>
+          </p:sp>
+          <p:sp>
+            <p:nvSpPr>
+              <p:cNvPr id="64" name="직사각형 63"/>
+              <p:cNvSpPr/>
+              <p:nvPr/>
+            </p:nvSpPr>
+            <p:spPr bwMode="auto">
+              <a:xfrm>
+                <a:off x="3624736" y="5160983"/>
+                <a:ext cx="1829317" cy="589976"/>
+              </a:xfrm>
+              <a:prstGeom prst="rect">
+                <a:avLst/>
+              </a:prstGeom>
+              <a:solidFill>
+                <a:srgbClr val="FFC000">
+                  <a:alpha val="55000"/>
+                </a:srgbClr>
+              </a:solidFill>
+              <a:ln w="31750" cap="flat" cmpd="dbl" algn="ctr">
+                <a:solidFill>
+                  <a:schemeClr val="tx1"/>
+                </a:solidFill>
+                <a:prstDash val="solid"/>
+                <a:round/>
+                <a:headEnd type="none" w="med" len="med"/>
+                <a:tailEnd type="none" w="med" len="med"/>
+              </a:ln>
+              <a:effectLst/>
+            </p:spPr>
+            <p:txBody>
+              <a:bodyPr vert="horz" wrap="none" lIns="90000" tIns="46800" rIns="90000" bIns="46800" numCol="1" rtlCol="0" anchor="ctr" anchorCtr="0" compatLnSpc="1">
+                <a:prstTxWarp prst="textNoShape">
+                  <a:avLst/>
+                </a:prstTxWarp>
+              </a:bodyPr>
+              <a:lstStyle/>
+              <a:p>
+                <a:pPr algn="ctr"/>
+                <a:r>
+                  <a:rPr lang="en-US" altLang="ko-KR" dirty="0" err="1">
+                    <a:latin typeface="맑은 고딕" pitchFamily="50" charset="-127"/>
+                    <a:ea typeface="맑은 고딕" pitchFamily="50" charset="-127"/>
+                  </a:rPr>
+                  <a:t>Todo</a:t>
+                </a:r>
+                <a:r>
+                  <a:rPr lang="ko-KR" altLang="en-US" dirty="0">
+                    <a:latin typeface="맑은 고딕" pitchFamily="50" charset="-127"/>
+                    <a:ea typeface="맑은 고딕" pitchFamily="50" charset="-127"/>
+                  </a:rPr>
+                  <a:t>정보 </a:t>
+                </a:r>
+                <a:r>
+                  <a:rPr lang="ko-KR" altLang="en-US" dirty="0" smtClean="0">
+                    <a:latin typeface="맑은 고딕" pitchFamily="50" charset="-127"/>
+                    <a:ea typeface="맑은 고딕" pitchFamily="50" charset="-127"/>
+                  </a:rPr>
+                  <a:t>리스트</a:t>
+                </a:r>
+                <a:endParaRPr lang="en-US" altLang="ko-KR" dirty="0" smtClean="0">
+                  <a:latin typeface="맑은 고딕" pitchFamily="50" charset="-127"/>
+                  <a:ea typeface="맑은 고딕" pitchFamily="50" charset="-127"/>
+                </a:endParaRPr>
+              </a:p>
+              <a:p>
+                <a:pPr algn="ctr"/>
+                <a:r>
+                  <a:rPr kumimoji="0" lang="ko-KR" altLang="en-US" sz="1400" b="0" i="0" u="none" strike="noStrike" cap="none" normalizeH="0" baseline="0" dirty="0" smtClean="0">
+                    <a:ln>
+                      <a:noFill/>
+                    </a:ln>
+                    <a:solidFill>
+                      <a:schemeClr val="tx1"/>
+                    </a:solidFill>
+                    <a:effectLst/>
+                    <a:latin typeface="맑은 고딕" pitchFamily="50" charset="-127"/>
+                    <a:ea typeface="맑은 고딕" pitchFamily="50" charset="-127"/>
+                  </a:rPr>
+                  <a:t>출력</a:t>
+                </a:r>
+                <a:endParaRPr kumimoji="0" lang="en-US" altLang="ko-KR" sz="1400" b="0" i="0" u="none" strike="noStrike" cap="none" normalizeH="0" baseline="0" dirty="0">
+                  <a:ln>
+                    <a:noFill/>
+                  </a:ln>
+                  <a:solidFill>
+                    <a:schemeClr val="tx1"/>
+                  </a:solidFill>
+                  <a:effectLst/>
+                  <a:latin typeface="맑은 고딕" pitchFamily="50" charset="-127"/>
+                  <a:ea typeface="맑은 고딕" pitchFamily="50" charset="-127"/>
+                </a:endParaRPr>
+              </a:p>
+            </p:txBody>
+          </p:sp>
+          <p:sp>
+            <p:nvSpPr>
+              <p:cNvPr id="65" name="직사각형 64"/>
+              <p:cNvSpPr/>
+              <p:nvPr/>
+            </p:nvSpPr>
+            <p:spPr bwMode="auto">
+              <a:xfrm>
+                <a:off x="3624736" y="5874324"/>
+                <a:ext cx="1829317" cy="589976"/>
+              </a:xfrm>
+              <a:prstGeom prst="rect">
+                <a:avLst/>
+              </a:prstGeom>
+              <a:solidFill>
+                <a:srgbClr val="FFC000">
+                  <a:alpha val="55000"/>
+                </a:srgbClr>
+              </a:solidFill>
+              <a:ln w="31750" cap="flat" cmpd="dbl" algn="ctr">
+                <a:solidFill>
+                  <a:schemeClr val="tx1"/>
+                </a:solidFill>
+                <a:prstDash val="solid"/>
+                <a:round/>
+                <a:headEnd type="none" w="med" len="med"/>
+                <a:tailEnd type="none" w="med" len="med"/>
+              </a:ln>
+              <a:effectLst/>
+            </p:spPr>
+            <p:txBody>
+              <a:bodyPr vert="horz" wrap="none" lIns="90000" tIns="46800" rIns="90000" bIns="46800" numCol="1" rtlCol="0" anchor="ctr" anchorCtr="0" compatLnSpc="1">
+                <a:prstTxWarp prst="textNoShape">
+                  <a:avLst/>
+                </a:prstTxWarp>
+              </a:bodyPr>
+              <a:lstStyle/>
+              <a:p>
+                <a:pPr marL="0" marR="0" indent="0" algn="ctr" defTabSz="914400" rtl="0" eaLnBrk="0" fontAlgn="base" latinLnBrk="0" hangingPunct="0">
+                  <a:lnSpc>
+                    <a:spcPct val="100000"/>
+                  </a:lnSpc>
+                  <a:spcBef>
+                    <a:spcPct val="0"/>
+                  </a:spcBef>
+                  <a:spcAft>
+                    <a:spcPct val="0"/>
+                  </a:spcAft>
+                  <a:buClrTx/>
+                  <a:buSzTx/>
+                  <a:buFontTx/>
+                  <a:buNone/>
+                  <a:tabLst/>
+                </a:pPr>
+                <a:r>
+                  <a:rPr lang="en-US" altLang="ko-KR" dirty="0" err="1" smtClean="0">
+                    <a:latin typeface="맑은 고딕" pitchFamily="50" charset="-127"/>
+                    <a:ea typeface="맑은 고딕" pitchFamily="50" charset="-127"/>
+                  </a:rPr>
+                  <a:t>Todo</a:t>
+                </a:r>
+                <a:r>
+                  <a:rPr lang="ko-KR" altLang="en-US" dirty="0" smtClean="0">
+                    <a:latin typeface="맑은 고딕" pitchFamily="50" charset="-127"/>
+                    <a:ea typeface="맑은 고딕" pitchFamily="50" charset="-127"/>
+                  </a:rPr>
+                  <a:t>정보 리스트 삭제</a:t>
+                </a:r>
+                <a:endParaRPr kumimoji="0" lang="en-US" altLang="ko-KR" sz="1400" b="0" i="0" u="none" strike="noStrike" cap="none" normalizeH="0" baseline="0" dirty="0">
+                  <a:ln>
+                    <a:noFill/>
+                  </a:ln>
+                  <a:solidFill>
+                    <a:schemeClr val="tx1"/>
+                  </a:solidFill>
+                  <a:effectLst/>
+                  <a:latin typeface="맑은 고딕" pitchFamily="50" charset="-127"/>
+                  <a:ea typeface="맑은 고딕" pitchFamily="50" charset="-127"/>
+                </a:endParaRPr>
+              </a:p>
+            </p:txBody>
+          </p:sp>
+          <p:cxnSp>
+            <p:nvCxnSpPr>
+              <p:cNvPr id="66" name="꺾인 연결선[E] 65"/>
+              <p:cNvCxnSpPr>
+                <a:stCxn id="48" idx="3"/>
+                <a:endCxn id="50" idx="1"/>
+              </p:cNvCxnSpPr>
+              <p:nvPr/>
+            </p:nvCxnSpPr>
+            <p:spPr bwMode="auto">
+              <a:xfrm flipV="1">
+                <a:off x="2868755" y="595220"/>
+                <a:ext cx="766827" cy="1"/>
+              </a:xfrm>
+              <a:prstGeom prst="bentConnector3">
+                <a:avLst/>
+              </a:prstGeom>
+              <a:solidFill>
+                <a:schemeClr val="accent1"/>
+              </a:solidFill>
+              <a:ln w="12700" cap="flat" cmpd="sng" algn="ctr">
+                <a:solidFill>
+                  <a:schemeClr val="tx1"/>
+                </a:solidFill>
+                <a:prstDash val="solid"/>
+                <a:round/>
+                <a:headEnd type="none" w="med" len="med"/>
+                <a:tailEnd type="none" w="med" len="med"/>
+              </a:ln>
+              <a:effectLst/>
+            </p:spPr>
+          </p:cxnSp>
+          <p:cxnSp>
+            <p:nvCxnSpPr>
+              <p:cNvPr id="67" name="꺾인 연결선[E] 66"/>
+              <p:cNvCxnSpPr>
+                <a:stCxn id="50" idx="2"/>
+                <a:endCxn id="75" idx="0"/>
+              </p:cNvCxnSpPr>
+              <p:nvPr/>
+            </p:nvCxnSpPr>
+            <p:spPr bwMode="auto">
+              <a:xfrm rot="5400000">
+                <a:off x="3008190" y="1798"/>
+                <a:ext cx="642545" cy="2419862"/>
+              </a:xfrm>
+              <a:prstGeom prst="bentConnector3">
+                <a:avLst/>
+              </a:prstGeom>
+              <a:solidFill>
+                <a:schemeClr val="accent1"/>
+              </a:solidFill>
+              <a:ln w="12700" cap="flat" cmpd="sng" algn="ctr">
+                <a:solidFill>
+                  <a:schemeClr val="tx1"/>
+                </a:solidFill>
+                <a:prstDash val="solid"/>
+                <a:round/>
+                <a:headEnd type="none" w="med" len="med"/>
+                <a:tailEnd type="none" w="med" len="med"/>
+              </a:ln>
+              <a:effectLst/>
+            </p:spPr>
+          </p:cxnSp>
+          <p:cxnSp>
+            <p:nvCxnSpPr>
+              <p:cNvPr id="68" name="직선 연결선[R] 67"/>
+              <p:cNvCxnSpPr>
+                <a:stCxn id="50" idx="2"/>
+              </p:cNvCxnSpPr>
+              <p:nvPr/>
+            </p:nvCxnSpPr>
+            <p:spPr bwMode="auto">
+              <a:xfrm>
+                <a:off x="4539393" y="890457"/>
+                <a:ext cx="1" cy="642545"/>
+              </a:xfrm>
+              <a:prstGeom prst="line">
+                <a:avLst/>
+              </a:prstGeom>
+              <a:solidFill>
+                <a:schemeClr val="accent1"/>
+              </a:solidFill>
+              <a:ln w="12700" cap="flat" cmpd="sng" algn="ctr">
+                <a:solidFill>
+                  <a:schemeClr val="tx1"/>
+                </a:solidFill>
+                <a:prstDash val="solid"/>
+                <a:round/>
+                <a:headEnd type="none" w="med" len="med"/>
+                <a:tailEnd type="none" w="med" len="med"/>
+              </a:ln>
+              <a:effectLst/>
+            </p:spPr>
+          </p:cxnSp>
+          <p:cxnSp>
+            <p:nvCxnSpPr>
+              <p:cNvPr id="69" name="꺾인 연결선[E] 68"/>
+              <p:cNvCxnSpPr/>
+              <p:nvPr/>
+            </p:nvCxnSpPr>
+            <p:spPr bwMode="auto">
+              <a:xfrm>
+                <a:off x="5454052" y="1827990"/>
+                <a:ext cx="1055091" cy="543893"/>
+              </a:xfrm>
+              <a:prstGeom prst="bentConnector2">
+                <a:avLst/>
+              </a:prstGeom>
+              <a:solidFill>
+                <a:schemeClr val="accent1"/>
+              </a:solidFill>
+              <a:ln w="12700" cap="flat" cmpd="sng" algn="ctr">
+                <a:solidFill>
+                  <a:schemeClr val="tx1"/>
+                </a:solidFill>
+                <a:prstDash val="solid"/>
+                <a:round/>
+                <a:headEnd type="none" w="med" len="med"/>
+                <a:tailEnd type="none" w="med" len="med"/>
+              </a:ln>
+              <a:effectLst/>
+            </p:spPr>
+          </p:cxnSp>
+          <p:cxnSp>
+            <p:nvCxnSpPr>
+              <p:cNvPr id="70" name="꺾인 연결선[E] 69"/>
+              <p:cNvCxnSpPr>
+                <a:stCxn id="75" idx="1"/>
+              </p:cNvCxnSpPr>
+              <p:nvPr/>
+            </p:nvCxnSpPr>
+            <p:spPr bwMode="auto">
+              <a:xfrm rot="10800000" flipV="1">
+                <a:off x="1061133" y="1825667"/>
+                <a:ext cx="12700" cy="4318834"/>
+              </a:xfrm>
+              <a:prstGeom prst="bentConnector3">
+                <a:avLst>
+                  <a:gd name="adj1" fmla="val 1800000"/>
+                </a:avLst>
+              </a:prstGeom>
+              <a:solidFill>
+                <a:schemeClr val="accent1"/>
+              </a:solidFill>
+              <a:ln w="12700" cap="flat" cmpd="sng" algn="ctr">
+                <a:solidFill>
+                  <a:schemeClr val="tx1"/>
+                </a:solidFill>
+                <a:prstDash val="solid"/>
+                <a:round/>
+                <a:headEnd type="none" w="med" len="med"/>
+                <a:tailEnd type="none" w="med" len="med"/>
+              </a:ln>
+              <a:effectLst/>
+            </p:spPr>
+          </p:cxnSp>
+          <p:cxnSp>
+            <p:nvCxnSpPr>
+              <p:cNvPr id="71" name="직선 연결선[R] 70"/>
+              <p:cNvCxnSpPr>
+                <a:stCxn id="79" idx="1"/>
+              </p:cNvCxnSpPr>
+              <p:nvPr/>
+            </p:nvCxnSpPr>
+            <p:spPr bwMode="auto">
+              <a:xfrm flipH="1" flipV="1">
+                <a:off x="831378" y="2642432"/>
+                <a:ext cx="229760" cy="1"/>
+              </a:xfrm>
+              <a:prstGeom prst="line">
+                <a:avLst/>
+              </a:prstGeom>
+              <a:solidFill>
+                <a:schemeClr val="accent1"/>
+              </a:solidFill>
+              <a:ln w="12700" cap="flat" cmpd="sng" algn="ctr">
+                <a:solidFill>
+                  <a:schemeClr val="tx1"/>
+                </a:solidFill>
+                <a:prstDash val="solid"/>
+                <a:round/>
+                <a:headEnd type="none" w="med" len="med"/>
+                <a:tailEnd type="none" w="med" len="med"/>
+              </a:ln>
+              <a:effectLst/>
+            </p:spPr>
+          </p:cxnSp>
+          <p:cxnSp>
+            <p:nvCxnSpPr>
+              <p:cNvPr id="72" name="직선 연결선[R] 71"/>
+              <p:cNvCxnSpPr>
+                <a:stCxn id="78" idx="1"/>
+              </p:cNvCxnSpPr>
+              <p:nvPr/>
+            </p:nvCxnSpPr>
+            <p:spPr bwMode="auto">
+              <a:xfrm flipH="1" flipV="1">
+                <a:off x="831376" y="3343481"/>
+                <a:ext cx="229760" cy="1"/>
+              </a:xfrm>
+              <a:prstGeom prst="line">
+                <a:avLst/>
+              </a:prstGeom>
+              <a:solidFill>
+                <a:schemeClr val="accent1"/>
+              </a:solidFill>
+              <a:ln w="12700" cap="flat" cmpd="sng" algn="ctr">
+                <a:solidFill>
+                  <a:schemeClr val="tx1"/>
+                </a:solidFill>
+                <a:prstDash val="solid"/>
+                <a:round/>
+                <a:headEnd type="none" w="med" len="med"/>
+                <a:tailEnd type="none" w="med" len="med"/>
+              </a:ln>
+              <a:effectLst/>
+            </p:spPr>
+          </p:cxnSp>
+          <p:cxnSp>
+            <p:nvCxnSpPr>
+              <p:cNvPr id="73" name="직선 연결선[R] 72"/>
+              <p:cNvCxnSpPr>
+                <a:stCxn id="81" idx="1"/>
+              </p:cNvCxnSpPr>
+              <p:nvPr/>
+            </p:nvCxnSpPr>
+            <p:spPr bwMode="auto">
+              <a:xfrm flipH="1" flipV="1">
+                <a:off x="831376" y="4042743"/>
+                <a:ext cx="229757" cy="201"/>
+              </a:xfrm>
+              <a:prstGeom prst="line">
+                <a:avLst/>
+              </a:prstGeom>
+              <a:solidFill>
+                <a:schemeClr val="accent1"/>
+              </a:solidFill>
+              <a:ln w="12700" cap="flat" cmpd="sng" algn="ctr">
+                <a:solidFill>
+                  <a:schemeClr val="tx1"/>
+                </a:solidFill>
+                <a:prstDash val="solid"/>
+                <a:round/>
+                <a:headEnd type="none" w="med" len="med"/>
+                <a:tailEnd type="none" w="med" len="med"/>
+              </a:ln>
+              <a:effectLst/>
+            </p:spPr>
+          </p:cxnSp>
+          <p:cxnSp>
+            <p:nvCxnSpPr>
+              <p:cNvPr id="74" name="직선 연결선[R] 73"/>
+              <p:cNvCxnSpPr>
+                <a:stCxn id="82" idx="1"/>
+              </p:cNvCxnSpPr>
+              <p:nvPr/>
+            </p:nvCxnSpPr>
+            <p:spPr bwMode="auto">
+              <a:xfrm flipH="1">
+                <a:off x="831376" y="4747163"/>
+                <a:ext cx="229757" cy="3792"/>
+              </a:xfrm>
+              <a:prstGeom prst="line">
+                <a:avLst/>
+              </a:prstGeom>
+              <a:solidFill>
+                <a:schemeClr val="accent1"/>
+              </a:solidFill>
+              <a:ln w="12700" cap="flat" cmpd="sng" algn="ctr">
+                <a:solidFill>
+                  <a:schemeClr val="tx1"/>
+                </a:solidFill>
+                <a:prstDash val="solid"/>
+                <a:round/>
+                <a:headEnd type="none" w="med" len="med"/>
+                <a:tailEnd type="none" w="med" len="med"/>
+              </a:ln>
+              <a:effectLst/>
+            </p:spPr>
+          </p:cxnSp>
+          <p:cxnSp>
+            <p:nvCxnSpPr>
+              <p:cNvPr id="75" name="직선 연결선[R] 74"/>
+              <p:cNvCxnSpPr>
+                <a:stCxn id="83" idx="1"/>
+              </p:cNvCxnSpPr>
+              <p:nvPr/>
+            </p:nvCxnSpPr>
+            <p:spPr bwMode="auto">
+              <a:xfrm flipH="1">
+                <a:off x="831376" y="5446625"/>
+                <a:ext cx="229757" cy="4757"/>
+              </a:xfrm>
+              <a:prstGeom prst="line">
+                <a:avLst/>
+              </a:prstGeom>
+              <a:solidFill>
+                <a:schemeClr val="accent1"/>
+              </a:solidFill>
+              <a:ln w="12700" cap="flat" cmpd="sng" algn="ctr">
+                <a:solidFill>
+                  <a:schemeClr val="tx1"/>
+                </a:solidFill>
+                <a:prstDash val="solid"/>
+                <a:round/>
+                <a:headEnd type="none" w="med" len="med"/>
+                <a:tailEnd type="none" w="med" len="med"/>
+              </a:ln>
+              <a:effectLst/>
+            </p:spPr>
+          </p:cxnSp>
+          <p:cxnSp>
+            <p:nvCxnSpPr>
+              <p:cNvPr id="76" name="직선 연결선[R] 75"/>
+              <p:cNvCxnSpPr/>
+              <p:nvPr/>
+            </p:nvCxnSpPr>
+            <p:spPr bwMode="auto">
+              <a:xfrm flipH="1">
+                <a:off x="6509142" y="2961859"/>
+                <a:ext cx="1" cy="151494"/>
+              </a:xfrm>
+              <a:prstGeom prst="line">
+                <a:avLst/>
+              </a:prstGeom>
+              <a:solidFill>
+                <a:schemeClr val="accent1"/>
+              </a:solidFill>
+              <a:ln w="12700" cap="flat" cmpd="sng" algn="ctr">
+                <a:solidFill>
+                  <a:schemeClr val="tx1"/>
+                </a:solidFill>
+                <a:prstDash val="solid"/>
+                <a:round/>
+                <a:headEnd type="none" w="med" len="med"/>
+                <a:tailEnd type="none" w="med" len="med"/>
+              </a:ln>
+              <a:effectLst/>
+            </p:spPr>
+          </p:cxnSp>
+          <p:cxnSp>
+            <p:nvCxnSpPr>
+              <p:cNvPr id="77" name="직선 연결선[R] 76"/>
+              <p:cNvCxnSpPr/>
+              <p:nvPr/>
+            </p:nvCxnSpPr>
+            <p:spPr bwMode="auto">
+              <a:xfrm flipH="1">
+                <a:off x="3420094" y="4042743"/>
+                <a:ext cx="204642" cy="0"/>
+              </a:xfrm>
+              <a:prstGeom prst="line">
+                <a:avLst/>
+              </a:prstGeom>
+              <a:solidFill>
+                <a:schemeClr val="accent1"/>
+              </a:solidFill>
+              <a:ln w="12700" cap="flat" cmpd="sng" algn="ctr">
+                <a:solidFill>
+                  <a:schemeClr val="tx1"/>
+                </a:solidFill>
+                <a:prstDash val="solid"/>
+                <a:round/>
+                <a:headEnd type="none" w="med" len="med"/>
+                <a:tailEnd type="none" w="med" len="med"/>
+              </a:ln>
+              <a:effectLst/>
+            </p:spPr>
+          </p:cxnSp>
+          <p:cxnSp>
+            <p:nvCxnSpPr>
+              <p:cNvPr id="78" name="직선 연결선[R] 77"/>
+              <p:cNvCxnSpPr/>
+              <p:nvPr/>
+            </p:nvCxnSpPr>
+            <p:spPr bwMode="auto">
+              <a:xfrm flipH="1">
+                <a:off x="3420094" y="3336129"/>
+                <a:ext cx="204645" cy="0"/>
+              </a:xfrm>
+              <a:prstGeom prst="line">
+                <a:avLst/>
+              </a:prstGeom>
+              <a:solidFill>
+                <a:schemeClr val="accent1"/>
+              </a:solidFill>
+              <a:ln w="12700" cap="flat" cmpd="sng" algn="ctr">
+                <a:solidFill>
+                  <a:schemeClr val="tx1"/>
+                </a:solidFill>
+                <a:prstDash val="solid"/>
+                <a:round/>
+                <a:headEnd type="none" w="med" len="med"/>
+                <a:tailEnd type="none" w="med" len="med"/>
+              </a:ln>
+              <a:effectLst/>
+            </p:spPr>
+          </p:cxnSp>
+          <p:cxnSp>
+            <p:nvCxnSpPr>
+              <p:cNvPr id="79" name="직선 연결선[R] 78"/>
+              <p:cNvCxnSpPr/>
+              <p:nvPr/>
+            </p:nvCxnSpPr>
+            <p:spPr bwMode="auto">
+              <a:xfrm flipH="1">
+                <a:off x="3420094" y="2629515"/>
+                <a:ext cx="204646" cy="0"/>
+              </a:xfrm>
+              <a:prstGeom prst="line">
+                <a:avLst/>
+              </a:prstGeom>
+              <a:solidFill>
+                <a:schemeClr val="accent1"/>
+              </a:solidFill>
+              <a:ln w="12700" cap="flat" cmpd="sng" algn="ctr">
+                <a:solidFill>
+                  <a:schemeClr val="tx1"/>
+                </a:solidFill>
+                <a:prstDash val="solid"/>
+                <a:round/>
+                <a:headEnd type="none" w="med" len="med"/>
+                <a:tailEnd type="none" w="med" len="med"/>
+              </a:ln>
+              <a:effectLst/>
+            </p:spPr>
+          </p:cxnSp>
+          <p:cxnSp>
+            <p:nvCxnSpPr>
+              <p:cNvPr id="80" name="직선 연결선[R] 79"/>
+              <p:cNvCxnSpPr/>
+              <p:nvPr/>
+            </p:nvCxnSpPr>
+            <p:spPr bwMode="auto">
+              <a:xfrm flipH="1" flipV="1">
+                <a:off x="3420094" y="4747162"/>
+                <a:ext cx="204642" cy="3793"/>
+              </a:xfrm>
+              <a:prstGeom prst="line">
+                <a:avLst/>
+              </a:prstGeom>
+              <a:solidFill>
+                <a:schemeClr val="accent1"/>
+              </a:solidFill>
+              <a:ln w="12700" cap="flat" cmpd="sng" algn="ctr">
+                <a:solidFill>
+                  <a:schemeClr val="tx1"/>
+                </a:solidFill>
+                <a:prstDash val="solid"/>
+                <a:round/>
+                <a:headEnd type="none" w="med" len="med"/>
+                <a:tailEnd type="none" w="med" len="med"/>
+              </a:ln>
+              <a:effectLst/>
+            </p:spPr>
+          </p:cxnSp>
+          <p:cxnSp>
+            <p:nvCxnSpPr>
+              <p:cNvPr id="81" name="직선 연결선[R] 80"/>
+              <p:cNvCxnSpPr/>
+              <p:nvPr/>
+            </p:nvCxnSpPr>
+            <p:spPr bwMode="auto">
+              <a:xfrm flipH="1">
+                <a:off x="3420094" y="5455971"/>
+                <a:ext cx="204642" cy="0"/>
+              </a:xfrm>
+              <a:prstGeom prst="line">
+                <a:avLst/>
+              </a:prstGeom>
+              <a:solidFill>
+                <a:schemeClr val="accent1"/>
+              </a:solidFill>
+              <a:ln w="12700" cap="flat" cmpd="sng" algn="ctr">
+                <a:solidFill>
+                  <a:schemeClr val="tx1"/>
+                </a:solidFill>
+                <a:prstDash val="solid"/>
+                <a:round/>
+                <a:headEnd type="none" w="med" len="med"/>
+                <a:tailEnd type="none" w="med" len="med"/>
+              </a:ln>
+              <a:effectLst/>
+            </p:spPr>
+          </p:cxnSp>
+          <p:cxnSp>
+            <p:nvCxnSpPr>
+              <p:cNvPr id="82" name="꺾인 연결선[E] 81"/>
+              <p:cNvCxnSpPr/>
+              <p:nvPr/>
+            </p:nvCxnSpPr>
+            <p:spPr bwMode="auto">
+              <a:xfrm rot="10800000" flipH="1" flipV="1">
+                <a:off x="3624734" y="1827990"/>
+                <a:ext cx="1" cy="4341322"/>
+              </a:xfrm>
+              <a:prstGeom prst="bentConnector3">
+                <a:avLst>
+                  <a:gd name="adj1" fmla="val -22860000000"/>
+                </a:avLst>
+              </a:prstGeom>
+              <a:solidFill>
+                <a:schemeClr val="accent1"/>
+              </a:solidFill>
+              <a:ln w="12700" cap="flat" cmpd="sng" algn="ctr">
+                <a:solidFill>
+                  <a:schemeClr val="tx1"/>
+                </a:solidFill>
+                <a:prstDash val="solid"/>
+                <a:round/>
+                <a:headEnd type="none" w="med" len="med"/>
+                <a:tailEnd type="none" w="med" len="med"/>
+              </a:ln>
+              <a:effectLst/>
+            </p:spPr>
+          </p:cxnSp>
+          <p:sp>
+            <p:nvSpPr>
+              <p:cNvPr id="83" name="직사각형 82"/>
+              <p:cNvSpPr/>
+              <p:nvPr/>
+            </p:nvSpPr>
+            <p:spPr bwMode="auto">
+              <a:xfrm>
+                <a:off x="5594483" y="4449851"/>
+                <a:ext cx="1829317" cy="589976"/>
+              </a:xfrm>
+              <a:prstGeom prst="rect">
+                <a:avLst/>
+              </a:prstGeom>
+              <a:solidFill>
+                <a:srgbClr val="FFC000">
+                  <a:alpha val="55000"/>
+                </a:srgbClr>
+              </a:solidFill>
+              <a:ln w="31750" cap="flat" cmpd="dbl" algn="ctr">
+                <a:solidFill>
+                  <a:schemeClr val="tx1"/>
+                </a:solidFill>
+                <a:prstDash val="solid"/>
+                <a:round/>
+                <a:headEnd type="none" w="med" len="med"/>
+                <a:tailEnd type="none" w="med" len="med"/>
+              </a:ln>
+              <a:effectLst/>
+            </p:spPr>
+            <p:txBody>
+              <a:bodyPr vert="horz" wrap="none" lIns="90000" tIns="46800" rIns="90000" bIns="46800" numCol="1" rtlCol="0" anchor="ctr" anchorCtr="0" compatLnSpc="1">
+                <a:prstTxWarp prst="textNoShape">
+                  <a:avLst/>
+                </a:prstTxWarp>
+              </a:bodyPr>
+              <a:lstStyle/>
+              <a:p>
+                <a:pPr marL="0" marR="0" indent="0" algn="ctr" defTabSz="914400" rtl="0" eaLnBrk="0" fontAlgn="base" latinLnBrk="0" hangingPunct="0">
+                  <a:lnSpc>
+                    <a:spcPct val="100000"/>
+                  </a:lnSpc>
+                  <a:spcBef>
+                    <a:spcPct val="0"/>
+                  </a:spcBef>
+                  <a:spcAft>
+                    <a:spcPct val="0"/>
+                  </a:spcAft>
+                  <a:buClrTx/>
+                  <a:buSzTx/>
+                  <a:buFontTx/>
+                  <a:buNone/>
+                  <a:tabLst/>
+                </a:pPr>
+                <a:r>
+                  <a:rPr lang="ko-KR" altLang="en-US" dirty="0" smtClean="0">
+                    <a:latin typeface="맑은 고딕" pitchFamily="50" charset="-127"/>
+                    <a:ea typeface="맑은 고딕" pitchFamily="50" charset="-127"/>
+                  </a:rPr>
+                  <a:t>알람 시스템</a:t>
+                </a:r>
+                <a:endParaRPr kumimoji="0" lang="en-US" altLang="ko-KR" sz="1400" b="0" i="0" u="none" strike="noStrike" cap="none" normalizeH="0" baseline="0" dirty="0">
+                  <a:ln>
+                    <a:noFill/>
+                  </a:ln>
+                  <a:solidFill>
+                    <a:schemeClr val="tx1"/>
+                  </a:solidFill>
+                  <a:effectLst/>
+                  <a:latin typeface="맑은 고딕" pitchFamily="50" charset="-127"/>
+                  <a:ea typeface="맑은 고딕" pitchFamily="50" charset="-127"/>
+                </a:endParaRPr>
+              </a:p>
+            </p:txBody>
+          </p:sp>
+          <p:cxnSp>
+            <p:nvCxnSpPr>
+              <p:cNvPr id="84" name="꺾인 연결선[E] 83"/>
+              <p:cNvCxnSpPr/>
+              <p:nvPr/>
+            </p:nvCxnSpPr>
+            <p:spPr bwMode="auto">
+              <a:xfrm rot="5400000" flipH="1" flipV="1">
+                <a:off x="3615667" y="3543690"/>
+                <a:ext cx="1397338" cy="4389611"/>
+              </a:xfrm>
+              <a:prstGeom prst="bentConnector3">
+                <a:avLst>
+                  <a:gd name="adj1" fmla="val -16360"/>
+                </a:avLst>
+              </a:prstGeom>
+              <a:solidFill>
+                <a:schemeClr val="accent1"/>
+              </a:solidFill>
+              <a:ln w="12700" cap="flat" cmpd="sng" algn="ctr">
+                <a:solidFill>
+                  <a:schemeClr val="tx1"/>
+                </a:solidFill>
+                <a:prstDash val="solid"/>
+                <a:round/>
+                <a:headEnd type="none" w="med" len="med"/>
+                <a:tailEnd type="none" w="med" len="med"/>
+              </a:ln>
+              <a:effectLst/>
+            </p:spPr>
+          </p:cxnSp>
+        </p:grpSp>
+        <p:cxnSp>
+          <p:nvCxnSpPr>
+            <p:cNvPr id="48" name="꺾인 연결선[E] 47"/>
+            <p:cNvCxnSpPr/>
+            <p:nvPr/>
+          </p:nvCxnSpPr>
+          <p:spPr bwMode="auto">
+            <a:xfrm rot="5400000" flipH="1" flipV="1">
+              <a:off x="5031487" y="4642831"/>
+              <a:ext cx="1424473" cy="1969747"/>
+            </a:xfrm>
+            <a:prstGeom prst="bentConnector3">
+              <a:avLst>
+                <a:gd name="adj1" fmla="val -16048"/>
+              </a:avLst>
+            </a:prstGeom>
+            <a:solidFill>
+              <a:schemeClr val="accent1"/>
+            </a:solidFill>
+            <a:ln w="12700" cap="flat" cmpd="sng" algn="ctr">
+              <a:solidFill>
+                <a:schemeClr val="tx1"/>
+              </a:solidFill>
+              <a:prstDash val="solid"/>
+              <a:round/>
+              <a:headEnd type="none" w="med" len="med"/>
+              <a:tailEnd type="none" w="med" len="med"/>
+            </a:ln>
+            <a:effectLst/>
+          </p:spPr>
+        </p:cxnSp>
+      </p:grpSp>
     </p:spTree>
     <p:extLst>
       <p:ext uri="{BB962C8B-B14F-4D97-AF65-F5344CB8AC3E}">

</xml_diff>